<commit_message>
2010-11 test evaluation H3
</commit_message>
<xml_diff>
--- a/one_pager.pptx
+++ b/one_pager.pptx
@@ -243,7 +243,7 @@
           <a:p>
             <a:fld id="{A93DB1A6-B2B7-43CD-B87A-C867DC960308}" type="datetimeFigureOut">
               <a:rPr lang="en-GB" smtClean="0"/>
-              <a:t>09/02/2020</a:t>
+              <a:t>05/03/2020</a:t>
             </a:fld>
             <a:endParaRPr lang="en-GB"/>
           </a:p>
@@ -413,7 +413,7 @@
           <a:p>
             <a:fld id="{A93DB1A6-B2B7-43CD-B87A-C867DC960308}" type="datetimeFigureOut">
               <a:rPr lang="en-GB" smtClean="0"/>
-              <a:t>09/02/2020</a:t>
+              <a:t>05/03/2020</a:t>
             </a:fld>
             <a:endParaRPr lang="en-GB"/>
           </a:p>
@@ -593,7 +593,7 @@
           <a:p>
             <a:fld id="{A93DB1A6-B2B7-43CD-B87A-C867DC960308}" type="datetimeFigureOut">
               <a:rPr lang="en-GB" smtClean="0"/>
-              <a:t>09/02/2020</a:t>
+              <a:t>05/03/2020</a:t>
             </a:fld>
             <a:endParaRPr lang="en-GB"/>
           </a:p>
@@ -763,7 +763,7 @@
           <a:p>
             <a:fld id="{A93DB1A6-B2B7-43CD-B87A-C867DC960308}" type="datetimeFigureOut">
               <a:rPr lang="en-GB" smtClean="0"/>
-              <a:t>09/02/2020</a:t>
+              <a:t>05/03/2020</a:t>
             </a:fld>
             <a:endParaRPr lang="en-GB"/>
           </a:p>
@@ -1009,7 +1009,7 @@
           <a:p>
             <a:fld id="{A93DB1A6-B2B7-43CD-B87A-C867DC960308}" type="datetimeFigureOut">
               <a:rPr lang="en-GB" smtClean="0"/>
-              <a:t>09/02/2020</a:t>
+              <a:t>05/03/2020</a:t>
             </a:fld>
             <a:endParaRPr lang="en-GB"/>
           </a:p>
@@ -1241,7 +1241,7 @@
           <a:p>
             <a:fld id="{A93DB1A6-B2B7-43CD-B87A-C867DC960308}" type="datetimeFigureOut">
               <a:rPr lang="en-GB" smtClean="0"/>
-              <a:t>09/02/2020</a:t>
+              <a:t>05/03/2020</a:t>
             </a:fld>
             <a:endParaRPr lang="en-GB"/>
           </a:p>
@@ -1608,7 +1608,7 @@
           <a:p>
             <a:fld id="{A93DB1A6-B2B7-43CD-B87A-C867DC960308}" type="datetimeFigureOut">
               <a:rPr lang="en-GB" smtClean="0"/>
-              <a:t>09/02/2020</a:t>
+              <a:t>05/03/2020</a:t>
             </a:fld>
             <a:endParaRPr lang="en-GB"/>
           </a:p>
@@ -1726,7 +1726,7 @@
           <a:p>
             <a:fld id="{A93DB1A6-B2B7-43CD-B87A-C867DC960308}" type="datetimeFigureOut">
               <a:rPr lang="en-GB" smtClean="0"/>
-              <a:t>09/02/2020</a:t>
+              <a:t>05/03/2020</a:t>
             </a:fld>
             <a:endParaRPr lang="en-GB"/>
           </a:p>
@@ -1821,7 +1821,7 @@
           <a:p>
             <a:fld id="{A93DB1A6-B2B7-43CD-B87A-C867DC960308}" type="datetimeFigureOut">
               <a:rPr lang="en-GB" smtClean="0"/>
-              <a:t>09/02/2020</a:t>
+              <a:t>05/03/2020</a:t>
             </a:fld>
             <a:endParaRPr lang="en-GB"/>
           </a:p>
@@ -2098,7 +2098,7 @@
           <a:p>
             <a:fld id="{A93DB1A6-B2B7-43CD-B87A-C867DC960308}" type="datetimeFigureOut">
               <a:rPr lang="en-GB" smtClean="0"/>
-              <a:t>09/02/2020</a:t>
+              <a:t>05/03/2020</a:t>
             </a:fld>
             <a:endParaRPr lang="en-GB"/>
           </a:p>
@@ -2355,7 +2355,7 @@
           <a:p>
             <a:fld id="{A93DB1A6-B2B7-43CD-B87A-C867DC960308}" type="datetimeFigureOut">
               <a:rPr lang="en-GB" smtClean="0"/>
-              <a:t>09/02/2020</a:t>
+              <a:t>05/03/2020</a:t>
             </a:fld>
             <a:endParaRPr lang="en-GB"/>
           </a:p>
@@ -2568,7 +2568,7 @@
           <a:p>
             <a:fld id="{A93DB1A6-B2B7-43CD-B87A-C867DC960308}" type="datetimeFigureOut">
               <a:rPr lang="en-GB" smtClean="0"/>
-              <a:t>09/02/2020</a:t>
+              <a:t>05/03/2020</a:t>
             </a:fld>
             <a:endParaRPr lang="en-GB"/>
           </a:p>
@@ -3000,14 +3000,14 @@
               <p:nvPr>
                 <p:extLst>
                   <p:ext uri="{D42A27DB-BD31-4B8C-83A1-F6EECF244321}">
-                    <p14:modId xmlns:p14="http://schemas.microsoft.com/office/powerpoint/2010/main" val="2286047102"/>
+                    <p14:modId xmlns:p14="http://schemas.microsoft.com/office/powerpoint/2010/main" val="2961576876"/>
                   </p:ext>
                 </p:extLst>
               </p:nvPr>
             </p:nvGraphicFramePr>
             <p:xfrm>
-              <a:off x="101600" y="91440"/>
-              <a:ext cx="11988801" cy="6909223"/>
+              <a:off x="91440" y="62145"/>
+              <a:ext cx="11998961" cy="6726959"/>
             </p:xfrm>
             <a:graphic>
               <a:graphicData uri="http://schemas.openxmlformats.org/drawingml/2006/table">
@@ -3016,28 +3016,28 @@
                     <a:tableStyleId>{69CF1AB2-1976-4502-BF36-3FF5EA218861}</a:tableStyleId>
                   </a:tblPr>
                   <a:tblGrid>
-                    <a:gridCol w="4088660">
+                    <a:gridCol w="3821865">
                       <a:extLst>
                         <a:ext uri="{9D8B030D-6E8A-4147-A177-3AD203B41FA5}">
                           <a16:colId xmlns:a16="http://schemas.microsoft.com/office/drawing/2014/main" val="617989892"/>
                         </a:ext>
                       </a:extLst>
                     </a:gridCol>
-                    <a:gridCol w="2476758">
+                    <a:gridCol w="2563586">
                       <a:extLst>
                         <a:ext uri="{9D8B030D-6E8A-4147-A177-3AD203B41FA5}">
                           <a16:colId xmlns:a16="http://schemas.microsoft.com/office/drawing/2014/main" val="705446048"/>
                         </a:ext>
                       </a:extLst>
                     </a:gridCol>
-                    <a:gridCol w="2696901">
+                    <a:gridCol w="2791446">
                       <a:extLst>
                         <a:ext uri="{9D8B030D-6E8A-4147-A177-3AD203B41FA5}">
                           <a16:colId xmlns:a16="http://schemas.microsoft.com/office/drawing/2014/main" val="2819006588"/>
                         </a:ext>
                       </a:extLst>
                     </a:gridCol>
-                    <a:gridCol w="2726482">
+                    <a:gridCol w="2822064">
                       <a:extLst>
                         <a:ext uri="{9D8B030D-6E8A-4147-A177-3AD203B41FA5}">
                           <a16:colId xmlns:a16="http://schemas.microsoft.com/office/drawing/2014/main" val="3759442639"/>
@@ -3045,7 +3045,7 @@
                       </a:extLst>
                     </a:gridCol>
                   </a:tblGrid>
-                  <a:tr h="628819">
+                  <a:tr h="579087">
                     <a:tc gridSpan="4">
                       <a:txBody>
                         <a:bodyPr/>
@@ -3149,7 +3149,7 @@
                       </a:ext>
                     </a:extLst>
                   </a:tr>
-                  <a:tr h="1516914">
+                  <a:tr h="1522445">
                     <a:tc gridSpan="4">
                       <a:txBody>
                         <a:bodyPr/>
@@ -3335,7 +3335,7 @@
                       </a:ext>
                     </a:extLst>
                   </a:tr>
-                  <a:tr h="718912">
+                  <a:tr h="1744354">
                     <a:tc>
                       <a:txBody>
                         <a:bodyPr/>
@@ -3352,7 +3352,7 @@
                             <a:buNone/>
                           </a:pPr>
                           <a:r>
-                            <a:rPr lang="en-GB" sz="1200" b="1" kern="1200" dirty="0">
+                            <a:rPr lang="en-GB" sz="1050" b="1" kern="1200" dirty="0">
                               <a:solidFill>
                                 <a:schemeClr val="dk1"/>
                               </a:solidFill>
@@ -3376,7 +3376,7 @@
                             <a:buChar char=""/>
                           </a:pPr>
                           <a:r>
-                            <a:rPr lang="en-GB" sz="1200" b="0" kern="1200" dirty="0">
+                            <a:rPr lang="en-GB" sz="1050" b="0" kern="1200" dirty="0">
                               <a:solidFill>
                                 <a:schemeClr val="dk1"/>
                               </a:solidFill>
@@ -3400,193 +3400,24 @@
                             <a:buChar char=""/>
                           </a:pPr>
                           <a:r>
-                            <a:rPr lang="en-GB" sz="1200" b="0" kern="1200" dirty="0">
-                              <a:solidFill>
-                                <a:schemeClr val="dk1"/>
-                              </a:solidFill>
-                              <a:effectLst/>
-                              <a:latin typeface="+mn-lt"/>
-                              <a:ea typeface="+mn-ea"/>
-                              <a:cs typeface="+mn-cs"/>
-                            </a:rPr>
-                            <a:t>Daily data. Daily trading. </a:t>
-                          </a:r>
-                        </a:p>
-                        <a:p>
-                          <a:pPr marL="342900" lvl="0" indent="-342900" algn="l">
-                            <a:lnSpc>
-                              <a:spcPct val="115000"/>
-                            </a:lnSpc>
-                            <a:spcAft>
-                              <a:spcPts val="0"/>
-                            </a:spcAft>
-                            <a:buFont typeface="Wingdings" panose="05000000000000000000" pitchFamily="2" charset="2"/>
-                            <a:buChar char=""/>
-                          </a:pPr>
-                          <a:r>
-                            <a:rPr lang="en-GB" sz="1200" b="0" kern="1200" dirty="0">
-                              <a:solidFill>
-                                <a:schemeClr val="dk1"/>
-                              </a:solidFill>
-                              <a:effectLst/>
-                              <a:latin typeface="+mn-lt"/>
-                              <a:ea typeface="+mn-ea"/>
-                              <a:cs typeface="+mn-cs"/>
-                            </a:rPr>
-                            <a:t>Starting balance $10,000, position $5,000</a:t>
-                          </a:r>
-                        </a:p>
-                        <a:p>
-                          <a:pPr marL="342900" lvl="0" indent="-342900" algn="l">
-                            <a:lnSpc>
-                              <a:spcPct val="115000"/>
-                            </a:lnSpc>
-                            <a:spcAft>
-                              <a:spcPts val="0"/>
-                            </a:spcAft>
-                            <a:buFont typeface="Wingdings" panose="05000000000000000000" pitchFamily="2" charset="2"/>
-                            <a:buChar char=""/>
-                          </a:pPr>
-                          <a:r>
-                            <a:rPr lang="en-GB" sz="1200" b="0" kern="1200" dirty="0">
-                              <a:solidFill>
-                                <a:schemeClr val="dk1"/>
-                              </a:solidFill>
-                              <a:effectLst/>
-                              <a:latin typeface="+mn-lt"/>
-                              <a:ea typeface="+mn-ea"/>
-                              <a:cs typeface="+mn-cs"/>
-                            </a:rPr>
-                            <a:t>1 step-ahead forecasting</a:t>
-                          </a:r>
-                        </a:p>
-                        <a:p>
-                          <a:pPr marL="342900" lvl="0" indent="-342900" algn="l">
-                            <a:lnSpc>
-                              <a:spcPct val="115000"/>
-                            </a:lnSpc>
-                            <a:spcAft>
-                              <a:spcPts val="0"/>
-                            </a:spcAft>
-                            <a:buFont typeface="Wingdings" panose="05000000000000000000" pitchFamily="2" charset="2"/>
-                            <a:buChar char=""/>
-                          </a:pPr>
-                          <a:r>
-                            <a:rPr lang="en-GB" sz="1200" b="0" kern="1200" dirty="0">
-                              <a:solidFill>
-                                <a:schemeClr val="dk1"/>
-                              </a:solidFill>
-                              <a:effectLst/>
-                              <a:latin typeface="+mn-lt"/>
-                              <a:ea typeface="+mn-ea"/>
-                              <a:cs typeface="+mn-cs"/>
-                            </a:rPr>
-                            <a:t>Using a 10day rolling window</a:t>
-                          </a:r>
-                        </a:p>
-                        <a:p>
-                          <a:pPr marL="342900" lvl="0" indent="-342900" algn="l">
-                            <a:lnSpc>
-                              <a:spcPct val="115000"/>
-                            </a:lnSpc>
-                            <a:spcAft>
-                              <a:spcPts val="0"/>
-                            </a:spcAft>
-                            <a:buFont typeface="Wingdings" panose="05000000000000000000" pitchFamily="2" charset="2"/>
-                            <a:buChar char=""/>
-                          </a:pPr>
-                          <a:r>
-                            <a:rPr lang="en-GB" sz="1200" b="0" kern="1200" dirty="0">
-                              <a:solidFill>
-                                <a:schemeClr val="dk1"/>
-                              </a:solidFill>
-                              <a:effectLst/>
-                              <a:latin typeface="+mn-lt"/>
-                              <a:ea typeface="+mn-ea"/>
-                              <a:cs typeface="+mn-cs"/>
-                            </a:rPr>
-                            <a:t>Binary classification (Buy, Sell)</a:t>
-                          </a:r>
-                        </a:p>
-                        <a:p>
-                          <a:pPr marL="342900" lvl="0" indent="-342900" algn="l">
-                            <a:lnSpc>
-                              <a:spcPct val="115000"/>
-                            </a:lnSpc>
-                            <a:spcAft>
-                              <a:spcPts val="0"/>
-                            </a:spcAft>
-                            <a:buFont typeface="Wingdings" panose="05000000000000000000" pitchFamily="2" charset="2"/>
-                            <a:buChar char=""/>
-                          </a:pPr>
-                          <a:r>
-                            <a:rPr lang="en-GB" sz="1200" b="0" kern="1200" dirty="0">
-                              <a:solidFill>
-                                <a:schemeClr val="dk1"/>
-                              </a:solidFill>
-                              <a:effectLst/>
-                              <a:latin typeface="+mn-lt"/>
-                              <a:ea typeface="+mn-ea"/>
-                              <a:cs typeface="+mn-cs"/>
-                            </a:rPr>
-                            <a:t>3% transaction cost per trade.</a:t>
-                          </a:r>
-                        </a:p>
-                      </a:txBody>
-                      <a:tcPr marL="49480" marR="49480" marT="0" marB="0"/>
-                    </a:tc>
-                    <a:tc>
-                      <a:txBody>
-                        <a:bodyPr/>
-                        <a:lstStyle/>
-                        <a:p>
-                          <a:pPr marL="0" lvl="0" indent="0" algn="ctr">
-                            <a:lnSpc>
-                              <a:spcPct val="115000"/>
-                            </a:lnSpc>
-                            <a:spcAft>
-                              <a:spcPts val="0"/>
-                            </a:spcAft>
-                            <a:buFont typeface="Wingdings" panose="05000000000000000000" pitchFamily="2" charset="2"/>
-                            <a:buNone/>
-                          </a:pPr>
-                          <a:r>
-                            <a:rPr lang="en-GB" sz="1200" b="1" kern="1200" dirty="0">
-                              <a:solidFill>
-                                <a:srgbClr val="FF0000"/>
-                              </a:solidFill>
-                              <a:effectLst/>
-                              <a:latin typeface="+mn-lt"/>
-                              <a:ea typeface="+mn-ea"/>
-                              <a:cs typeface="+mn-cs"/>
-                            </a:rPr>
-                            <a:t>GADF artificial images</a:t>
-                          </a:r>
-                        </a:p>
-                        <a:p>
-                          <a:pPr marL="342900" lvl="0" indent="-342900" algn="l">
-                            <a:lnSpc>
-                              <a:spcPct val="115000"/>
-                            </a:lnSpc>
-                            <a:spcAft>
-                              <a:spcPts val="0"/>
-                            </a:spcAft>
-                            <a:buFont typeface="Wingdings" panose="05000000000000000000" pitchFamily="2" charset="2"/>
-                            <a:buChar char=""/>
-                          </a:pPr>
-                          <a:r>
-                            <a:rPr lang="en-GB" sz="1200" b="0" kern="1200" dirty="0" err="1">
-                              <a:solidFill>
-                                <a:schemeClr val="dk1"/>
-                              </a:solidFill>
-                              <a:effectLst/>
-                              <a:latin typeface="+mn-lt"/>
-                              <a:ea typeface="+mn-ea"/>
-                              <a:cs typeface="+mn-cs"/>
-                            </a:rPr>
-                            <a:t>GAd</a:t>
-                          </a:r>
-                          <a:endParaRPr lang="en-GB" sz="1200" b="0" kern="1200" dirty="0">
+                            <a:rPr lang="en-GB" sz="1050" b="0" kern="1200" dirty="0">
+                              <a:solidFill>
+                                <a:schemeClr val="dk1"/>
+                              </a:solidFill>
+                              <a:effectLst/>
+                              <a:latin typeface="+mn-lt"/>
+                              <a:ea typeface="+mn-ea"/>
+                              <a:cs typeface="+mn-cs"/>
+                            </a:rPr>
+                            <a:t>Daily data. Daily trading. From </a:t>
+                          </a:r>
+                          <a:r>
+                            <a:rPr lang="en-GB" sz="1050" b="0" dirty="0">
+                              <a:effectLst/>
+                            </a:rPr>
+                            <a:t>1980-01 to 2010-01-01.</a:t>
+                          </a:r>
+                          <a:endParaRPr lang="en-GB" sz="1050" b="0" kern="1200" dirty="0">
                             <a:solidFill>
                               <a:schemeClr val="dk1"/>
                             </a:solidFill>
@@ -3607,7 +3438,170 @@
                             <a:buFont typeface="Wingdings" panose="05000000000000000000" pitchFamily="2" charset="2"/>
                             <a:buChar char=""/>
                           </a:pPr>
-                          <a:endParaRPr lang="en-GB" sz="1200" b="0" kern="1200" dirty="0">
+                          <a:r>
+                            <a:rPr lang="en-GB" sz="1050" b="0" kern="1200" dirty="0">
+                              <a:solidFill>
+                                <a:schemeClr val="dk1"/>
+                              </a:solidFill>
+                              <a:effectLst/>
+                              <a:latin typeface="+mn-lt"/>
+                              <a:ea typeface="+mn-ea"/>
+                              <a:cs typeface="+mn-cs"/>
+                            </a:rPr>
+                            <a:t>Starting balance $10,000, position $5,000</a:t>
+                          </a:r>
+                        </a:p>
+                        <a:p>
+                          <a:pPr marL="342900" lvl="0" indent="-342900" algn="l">
+                            <a:lnSpc>
+                              <a:spcPct val="115000"/>
+                            </a:lnSpc>
+                            <a:spcAft>
+                              <a:spcPts val="0"/>
+                            </a:spcAft>
+                            <a:buFont typeface="Wingdings" panose="05000000000000000000" pitchFamily="2" charset="2"/>
+                            <a:buChar char=""/>
+                          </a:pPr>
+                          <a:r>
+                            <a:rPr lang="en-GB" sz="1050" b="0" kern="1200" dirty="0">
+                              <a:solidFill>
+                                <a:schemeClr val="dk1"/>
+                              </a:solidFill>
+                              <a:effectLst/>
+                              <a:latin typeface="+mn-lt"/>
+                              <a:ea typeface="+mn-ea"/>
+                              <a:cs typeface="+mn-cs"/>
+                            </a:rPr>
+                            <a:t>1 step-ahead forecasting</a:t>
+                          </a:r>
+                        </a:p>
+                        <a:p>
+                          <a:pPr marL="342900" lvl="0" indent="-342900" algn="l">
+                            <a:lnSpc>
+                              <a:spcPct val="115000"/>
+                            </a:lnSpc>
+                            <a:spcAft>
+                              <a:spcPts val="0"/>
+                            </a:spcAft>
+                            <a:buFont typeface="Wingdings" panose="05000000000000000000" pitchFamily="2" charset="2"/>
+                            <a:buChar char=""/>
+                          </a:pPr>
+                          <a:r>
+                            <a:rPr lang="en-GB" sz="1050" b="0" kern="1200" dirty="0">
+                              <a:solidFill>
+                                <a:schemeClr val="dk1"/>
+                              </a:solidFill>
+                              <a:effectLst/>
+                              <a:latin typeface="+mn-lt"/>
+                              <a:ea typeface="+mn-ea"/>
+                              <a:cs typeface="+mn-cs"/>
+                            </a:rPr>
+                            <a:t>Using a 10day rolling window</a:t>
+                          </a:r>
+                        </a:p>
+                        <a:p>
+                          <a:pPr marL="342900" lvl="0" indent="-342900" algn="l">
+                            <a:lnSpc>
+                              <a:spcPct val="115000"/>
+                            </a:lnSpc>
+                            <a:spcAft>
+                              <a:spcPts val="0"/>
+                            </a:spcAft>
+                            <a:buFont typeface="Wingdings" panose="05000000000000000000" pitchFamily="2" charset="2"/>
+                            <a:buChar char=""/>
+                          </a:pPr>
+                          <a:r>
+                            <a:rPr lang="en-GB" sz="1050" b="0" kern="1200" dirty="0">
+                              <a:solidFill>
+                                <a:schemeClr val="dk1"/>
+                              </a:solidFill>
+                              <a:effectLst/>
+                              <a:latin typeface="+mn-lt"/>
+                              <a:ea typeface="+mn-ea"/>
+                              <a:cs typeface="+mn-cs"/>
+                            </a:rPr>
+                            <a:t>Binary classification (Buy, Sell)</a:t>
+                          </a:r>
+                        </a:p>
+                        <a:p>
+                          <a:pPr marL="342900" lvl="0" indent="-342900" algn="l">
+                            <a:lnSpc>
+                              <a:spcPct val="115000"/>
+                            </a:lnSpc>
+                            <a:spcAft>
+                              <a:spcPts val="0"/>
+                            </a:spcAft>
+                            <a:buFont typeface="Wingdings" panose="05000000000000000000" pitchFamily="2" charset="2"/>
+                            <a:buChar char=""/>
+                          </a:pPr>
+                          <a:r>
+                            <a:rPr lang="en-GB" sz="1050" b="0" kern="1200" dirty="0">
+                              <a:solidFill>
+                                <a:schemeClr val="dk1"/>
+                              </a:solidFill>
+                              <a:effectLst/>
+                              <a:latin typeface="+mn-lt"/>
+                              <a:ea typeface="+mn-ea"/>
+                              <a:cs typeface="+mn-cs"/>
+                            </a:rPr>
+                            <a:t>3% transaction cost per trade.</a:t>
+                          </a:r>
+                        </a:p>
+                      </a:txBody>
+                      <a:tcPr marL="49480" marR="49480" marT="0" marB="0"/>
+                    </a:tc>
+                    <a:tc>
+                      <a:txBody>
+                        <a:bodyPr/>
+                        <a:lstStyle/>
+                        <a:p>
+                          <a:pPr marL="0" lvl="0" indent="0" algn="ctr">
+                            <a:lnSpc>
+                              <a:spcPct val="115000"/>
+                            </a:lnSpc>
+                            <a:spcAft>
+                              <a:spcPts val="0"/>
+                            </a:spcAft>
+                            <a:buFont typeface="Wingdings" panose="05000000000000000000" pitchFamily="2" charset="2"/>
+                            <a:buNone/>
+                          </a:pPr>
+                          <a:r>
+                            <a:rPr lang="en-GB" sz="1050" b="1" kern="1200" dirty="0">
+                              <a:solidFill>
+                                <a:srgbClr val="FF0000"/>
+                              </a:solidFill>
+                              <a:effectLst/>
+                              <a:latin typeface="+mn-lt"/>
+                              <a:ea typeface="+mn-ea"/>
+                              <a:cs typeface="+mn-cs"/>
+                            </a:rPr>
+                            <a:t>GADF artificial images</a:t>
+                          </a:r>
+                        </a:p>
+                        <a:p>
+                          <a:pPr marL="342900" lvl="0" indent="-342900" algn="l">
+                            <a:lnSpc>
+                              <a:spcPct val="115000"/>
+                            </a:lnSpc>
+                            <a:spcAft>
+                              <a:spcPts val="0"/>
+                            </a:spcAft>
+                            <a:buFont typeface="Wingdings" panose="05000000000000000000" pitchFamily="2" charset="2"/>
+                            <a:buChar char=""/>
+                          </a:pPr>
+                          <a:r>
+                            <a:rPr lang="en-GB" sz="1050" b="0" kern="1200" dirty="0" err="1">
+                              <a:solidFill>
+                                <a:schemeClr val="dk1"/>
+                              </a:solidFill>
+                              <a:effectLst/>
+                              <a:latin typeface="+mn-lt"/>
+                              <a:ea typeface="+mn-ea"/>
+                              <a:cs typeface="+mn-cs"/>
+                            </a:rPr>
+                            <a:t>GAd</a:t>
+                          </a:r>
+                          <a:endParaRPr lang="en-GB" sz="1050" b="0" kern="1200" dirty="0">
                             <a:solidFill>
                               <a:schemeClr val="dk1"/>
                             </a:solidFill>
@@ -3628,7 +3622,7 @@
                             <a:buFont typeface="Wingdings" panose="05000000000000000000" pitchFamily="2" charset="2"/>
                             <a:buChar char=""/>
                           </a:pPr>
-                          <a:endParaRPr lang="en-GB" sz="1200" b="0" kern="1200" dirty="0">
+                          <a:endParaRPr lang="en-GB" sz="1050" b="0" kern="1200" dirty="0">
                             <a:solidFill>
                               <a:schemeClr val="dk1"/>
                             </a:solidFill>
@@ -3649,7 +3643,7 @@
                             <a:buFont typeface="Wingdings" panose="05000000000000000000" pitchFamily="2" charset="2"/>
                             <a:buChar char=""/>
                           </a:pPr>
-                          <a:endParaRPr lang="en-GB" sz="1200" b="0" kern="1200" dirty="0">
+                          <a:endParaRPr lang="en-GB" sz="1050" b="0" kern="1200" dirty="0">
                             <a:solidFill>
                               <a:schemeClr val="dk1"/>
                             </a:solidFill>
@@ -3670,7 +3664,7 @@
                             <a:buFont typeface="Wingdings" panose="05000000000000000000" pitchFamily="2" charset="2"/>
                             <a:buChar char=""/>
                           </a:pPr>
-                          <a:endParaRPr lang="en-GB" sz="1200" b="0" kern="1200" dirty="0">
+                          <a:endParaRPr lang="en-GB" sz="1050" b="0" kern="1200" dirty="0">
                             <a:solidFill>
                               <a:schemeClr val="dk1"/>
                             </a:solidFill>
@@ -3680,62 +3674,18 @@
                             <a:cs typeface="+mn-cs"/>
                           </a:endParaRPr>
                         </a:p>
-                      </a:txBody>
-                      <a:tcPr marL="49480" marR="49480" marT="0" marB="0"/>
-                    </a:tc>
-                    <a:tc>
-                      <a:txBody>
-                        <a:bodyPr/>
-                        <a:lstStyle/>
-                        <a:p>
-                          <a:pPr marL="0" lvl="0" indent="0" algn="ctr">
-                            <a:lnSpc>
-                              <a:spcPct val="115000"/>
-                            </a:lnSpc>
-                            <a:spcAft>
-                              <a:spcPts val="0"/>
-                            </a:spcAft>
-                            <a:buFont typeface="Wingdings" panose="05000000000000000000" pitchFamily="2" charset="2"/>
-                            <a:buNone/>
-                          </a:pPr>
-                          <a:r>
-                            <a:rPr lang="en-GB" sz="1200" b="1" kern="1200" dirty="0">
-                              <a:solidFill>
-                                <a:schemeClr val="dk1"/>
-                              </a:solidFill>
-                              <a:effectLst/>
-                              <a:latin typeface="+mn-lt"/>
-                              <a:ea typeface="+mn-ea"/>
-                              <a:cs typeface="+mn-cs"/>
-                            </a:rPr>
-                            <a:t>REC</a:t>
-                          </a:r>
-                        </a:p>
-                        <a:p>
-                          <a:pPr marL="171450" lvl="0" indent="-171450" algn="l">
-                            <a:lnSpc>
-                              <a:spcPct val="115000"/>
-                            </a:lnSpc>
-                            <a:spcAft>
-                              <a:spcPts val="0"/>
-                            </a:spcAft>
-                            <a:buFont typeface="Wingdings" panose="05000000000000000000" pitchFamily="2" charset="2"/>
-                            <a:buChar char="§"/>
-                          </a:pPr>
-                          <a:r>
-                            <a:rPr lang="en-GB" sz="1200" b="0" kern="1200" dirty="0">
-                              <a:solidFill>
-                                <a:schemeClr val="dk1"/>
-                              </a:solidFill>
-                              <a:effectLst/>
-                              <a:latin typeface="+mn-lt"/>
-                              <a:ea typeface="+mn-ea"/>
-                              <a:cs typeface="+mn-cs"/>
-                              <a:hlinkClick r:id="rId4"/>
-                            </a:rPr>
-                            <a:t>Recursive Feature Elimination</a:t>
-                          </a:r>
-                          <a:endParaRPr lang="en-GB" sz="1200" b="0" kern="1200" dirty="0">
+                        <a:p>
+                          <a:pPr marL="342900" lvl="0" indent="-342900" algn="l">
+                            <a:lnSpc>
+                              <a:spcPct val="115000"/>
+                            </a:lnSpc>
+                            <a:spcAft>
+                              <a:spcPts val="0"/>
+                            </a:spcAft>
+                            <a:buFont typeface="Wingdings" panose="05000000000000000000" pitchFamily="2" charset="2"/>
+                            <a:buChar char=""/>
+                          </a:pPr>
+                          <a:endParaRPr lang="en-GB" sz="1050" b="0" kern="1200" dirty="0">
                             <a:solidFill>
                               <a:schemeClr val="dk1"/>
                             </a:solidFill>
@@ -3745,6 +3695,37 @@
                             <a:cs typeface="+mn-cs"/>
                           </a:endParaRPr>
                         </a:p>
+                      </a:txBody>
+                      <a:tcPr marL="49480" marR="49480" marT="0" marB="0"/>
+                    </a:tc>
+                    <a:tc>
+                      <a:txBody>
+                        <a:bodyPr/>
+                        <a:lstStyle/>
+                        <a:p>
+                          <a:pPr marL="0" lvl="0" indent="0" algn="ctr">
+                            <a:lnSpc>
+                              <a:spcPct val="115000"/>
+                            </a:lnSpc>
+                            <a:spcAft>
+                              <a:spcPts val="0"/>
+                            </a:spcAft>
+                            <a:buFont typeface="Wingdings" panose="05000000000000000000" pitchFamily="2" charset="2"/>
+                            <a:buNone/>
+                          </a:pPr>
+                          <a:r>
+                            <a:rPr lang="en-GB" sz="1050" b="1" kern="1200" dirty="0">
+                              <a:solidFill>
+                                <a:schemeClr val="dk1"/>
+                              </a:solidFill>
+                              <a:effectLst/>
+                              <a:latin typeface="+mn-lt"/>
+                              <a:ea typeface="+mn-ea"/>
+                              <a:cs typeface="+mn-cs"/>
+                            </a:rPr>
+                            <a:t>REC</a:t>
+                          </a:r>
+                        </a:p>
                         <a:p>
                           <a:pPr marL="171450" lvl="0" indent="-171450" algn="l">
                             <a:lnSpc>
@@ -3757,30 +3738,19 @@
                             <a:buChar char="§"/>
                           </a:pPr>
                           <a:r>
-                            <a:rPr lang="en-GB" sz="1200" b="0" kern="1200" dirty="0">
-                              <a:solidFill>
-                                <a:schemeClr val="dk1"/>
-                              </a:solidFill>
-                              <a:effectLst/>
-                              <a:latin typeface="+mn-lt"/>
-                              <a:ea typeface="+mn-ea"/>
-                              <a:cs typeface="+mn-cs"/>
-                            </a:rPr>
-                            <a:t>Shows the relevance of pixels  for the classifier. Can be used to evaluate feature importance.</a:t>
-                          </a:r>
-                        </a:p>
-                        <a:p>
-                          <a:pPr marL="342900" lvl="0" indent="-342900" algn="l">
-                            <a:lnSpc>
-                              <a:spcPct val="115000"/>
-                            </a:lnSpc>
-                            <a:spcAft>
-                              <a:spcPts val="0"/>
-                            </a:spcAft>
-                            <a:buFont typeface="Wingdings" panose="05000000000000000000" pitchFamily="2" charset="2"/>
-                            <a:buChar char=""/>
-                          </a:pPr>
-                          <a:endParaRPr lang="en-GB" sz="1200" b="0" kern="1200" dirty="0">
+                            <a:rPr lang="en-GB" sz="1050" b="0" kern="1200" dirty="0">
+                              <a:solidFill>
+                                <a:schemeClr val="dk1"/>
+                              </a:solidFill>
+                              <a:effectLst/>
+                              <a:latin typeface="+mn-lt"/>
+                              <a:ea typeface="+mn-ea"/>
+                              <a:cs typeface="+mn-cs"/>
+                              <a:hlinkClick r:id="rId4"/>
+                            </a:rPr>
+                            <a:t>Recursive Feature Elimination</a:t>
+                          </a:r>
+                          <a:endParaRPr lang="en-GB" sz="1050" b="0" kern="1200" dirty="0">
                             <a:solidFill>
                               <a:schemeClr val="dk1"/>
                             </a:solidFill>
@@ -3791,6 +3761,30 @@
                           </a:endParaRPr>
                         </a:p>
                         <a:p>
+                          <a:pPr marL="171450" lvl="0" indent="-171450" algn="l">
+                            <a:lnSpc>
+                              <a:spcPct val="115000"/>
+                            </a:lnSpc>
+                            <a:spcAft>
+                              <a:spcPts val="0"/>
+                            </a:spcAft>
+                            <a:buFont typeface="Wingdings" panose="05000000000000000000" pitchFamily="2" charset="2"/>
+                            <a:buChar char="§"/>
+                          </a:pPr>
+                          <a:r>
+                            <a:rPr lang="en-GB" sz="1050" b="0" kern="1200" dirty="0">
+                              <a:solidFill>
+                                <a:schemeClr val="dk1"/>
+                              </a:solidFill>
+                              <a:effectLst/>
+                              <a:latin typeface="+mn-lt"/>
+                              <a:ea typeface="+mn-ea"/>
+                              <a:cs typeface="+mn-cs"/>
+                            </a:rPr>
+                            <a:t>Shows the relevance of pixels  for the classifier. Can be used to evaluate feature importance.</a:t>
+                          </a:r>
+                        </a:p>
+                        <a:p>
                           <a:pPr marL="342900" lvl="0" indent="-342900" algn="l">
                             <a:lnSpc>
                               <a:spcPct val="115000"/>
@@ -3801,7 +3795,7 @@
                             <a:buFont typeface="Wingdings" panose="05000000000000000000" pitchFamily="2" charset="2"/>
                             <a:buChar char=""/>
                           </a:pPr>
-                          <a:endParaRPr lang="en-GB" sz="1200" b="0" kern="1200" dirty="0">
+                          <a:endParaRPr lang="en-GB" sz="1050" b="0" kern="1200" dirty="0">
                             <a:solidFill>
                               <a:schemeClr val="dk1"/>
                             </a:solidFill>
@@ -3811,44 +3805,18 @@
                             <a:cs typeface="+mn-cs"/>
                           </a:endParaRPr>
                         </a:p>
-                      </a:txBody>
-                      <a:tcPr marL="49480" marR="49480" marT="0" marB="0"/>
-                    </a:tc>
-                    <a:tc>
-                      <a:txBody>
-                        <a:bodyPr/>
-                        <a:lstStyle/>
-                        <a:p>
-                          <a:pPr marL="0" marR="0" lvl="0" indent="0" algn="ctr" defTabSz="914400" rtl="0" eaLnBrk="1" fontAlgn="auto" latinLnBrk="0" hangingPunct="1">
-                            <a:lnSpc>
-                              <a:spcPct val="115000"/>
-                            </a:lnSpc>
-                            <a:spcBef>
-                              <a:spcPts val="0"/>
-                            </a:spcBef>
-                            <a:spcAft>
-                              <a:spcPts val="0"/>
-                            </a:spcAft>
-                            <a:buClrTx/>
-                            <a:buSzTx/>
-                            <a:buFont typeface="Wingdings" panose="05000000000000000000" pitchFamily="2" charset="2"/>
-                            <a:buNone/>
-                            <a:tabLst/>
-                            <a:defRPr/>
-                          </a:pPr>
-                          <a:r>
-                            <a:rPr lang="en-GB" sz="1200" b="1" kern="1200" dirty="0">
-                              <a:solidFill>
-                                <a:schemeClr val="dk1"/>
-                              </a:solidFill>
-                              <a:effectLst/>
-                              <a:latin typeface="+mn-lt"/>
-                              <a:ea typeface="+mn-ea"/>
-                              <a:cs typeface="+mn-cs"/>
-                            </a:rPr>
-                            <a:t>PCA</a:t>
-                          </a:r>
-                          <a:endParaRPr lang="en-GB" sz="1200" b="0" kern="1200" dirty="0">
+                        <a:p>
+                          <a:pPr marL="342900" lvl="0" indent="-342900" algn="l">
+                            <a:lnSpc>
+                              <a:spcPct val="115000"/>
+                            </a:lnSpc>
+                            <a:spcAft>
+                              <a:spcPts val="0"/>
+                            </a:spcAft>
+                            <a:buFont typeface="Wingdings" panose="05000000000000000000" pitchFamily="2" charset="2"/>
+                            <a:buChar char=""/>
+                          </a:pPr>
+                          <a:endParaRPr lang="en-GB" sz="1050" b="0" kern="1200" dirty="0">
                             <a:solidFill>
                               <a:schemeClr val="dk1"/>
                             </a:solidFill>
@@ -3858,6 +3826,53 @@
                             <a:cs typeface="+mn-cs"/>
                           </a:endParaRPr>
                         </a:p>
+                      </a:txBody>
+                      <a:tcPr marL="49480" marR="49480" marT="0" marB="0"/>
+                    </a:tc>
+                    <a:tc>
+                      <a:txBody>
+                        <a:bodyPr/>
+                        <a:lstStyle/>
+                        <a:p>
+                          <a:pPr marL="0" marR="0" lvl="0" indent="0" algn="ctr" defTabSz="914400" rtl="0" eaLnBrk="1" fontAlgn="auto" latinLnBrk="0" hangingPunct="1">
+                            <a:lnSpc>
+                              <a:spcPct val="115000"/>
+                            </a:lnSpc>
+                            <a:spcBef>
+                              <a:spcPts val="0"/>
+                            </a:spcBef>
+                            <a:spcAft>
+                              <a:spcPts val="0"/>
+                            </a:spcAft>
+                            <a:buClrTx/>
+                            <a:buSzTx/>
+                            <a:buFont typeface="Wingdings" panose="05000000000000000000" pitchFamily="2" charset="2"/>
+                            <a:buNone/>
+                            <a:tabLst/>
+                            <a:defRPr/>
+                          </a:pPr>
+                          <a:r>
+                            <a:rPr lang="en-GB" sz="1050" b="1" kern="1200" dirty="0">
+                              <a:solidFill>
+                                <a:schemeClr val="dk1"/>
+                              </a:solidFill>
+                              <a:effectLst/>
+                              <a:latin typeface="+mn-lt"/>
+                              <a:ea typeface="+mn-ea"/>
+                              <a:cs typeface="+mn-cs"/>
+                            </a:rPr>
+                            <a:t>PCA</a:t>
+                          </a:r>
+                          <a:endParaRPr lang="en-GB" sz="1050" b="0" kern="1200" dirty="0">
+                            <a:solidFill>
+                              <a:schemeClr val="dk1"/>
+                            </a:solidFill>
+                            <a:effectLst/>
+                            <a:latin typeface="+mn-lt"/>
+                            <a:ea typeface="+mn-ea"/>
+                            <a:cs typeface="+mn-cs"/>
+                          </a:endParaRPr>
+                        </a:p>
                         <a:p>
                           <a:pPr marL="342900" lvl="0" indent="-342900" algn="l">
                             <a:lnSpc>
@@ -3870,7 +3885,7 @@
                             <a:buChar char=""/>
                           </a:pPr>
                           <a:r>
-                            <a:rPr lang="en-GB" sz="1200" b="0" kern="1200" dirty="0">
+                            <a:rPr lang="en-GB" sz="1050" b="0" kern="1200" dirty="0">
                               <a:solidFill>
                                 <a:schemeClr val="dk1"/>
                               </a:solidFill>
@@ -3894,7 +3909,7 @@
                             <a:buChar char=""/>
                           </a:pPr>
                           <a:r>
-                            <a:rPr lang="en-GB" sz="1200" b="0" kern="1200" dirty="0">
+                            <a:rPr lang="en-GB" sz="1050" b="0" kern="1200" dirty="0">
                               <a:solidFill>
                                 <a:schemeClr val="dk1"/>
                               </a:solidFill>
@@ -3918,7 +3933,7 @@
                             <a:buChar char=""/>
                           </a:pPr>
                           <a:r>
-                            <a:rPr lang="en-GB" sz="1200" b="0" kern="1200" dirty="0">
+                            <a:rPr lang="en-GB" sz="1050" b="0" kern="1200" dirty="0">
                               <a:solidFill>
                                 <a:schemeClr val="dk1"/>
                               </a:solidFill>
@@ -3930,7 +3945,7 @@
                             <a:t>Normalized data 0-1. Used </a:t>
                           </a:r>
                           <a:r>
-                            <a:rPr lang="en-GB" sz="1200" b="0" kern="1200" dirty="0" err="1">
+                            <a:rPr lang="en-GB" sz="1050" b="0" kern="1200" dirty="0" err="1">
                               <a:solidFill>
                                 <a:schemeClr val="dk1"/>
                               </a:solidFill>
@@ -3942,7 +3957,7 @@
                             <a:t>covar</a:t>
                           </a:r>
                           <a:r>
-                            <a:rPr lang="en-GB" sz="1200" b="0" kern="1200" dirty="0">
+                            <a:rPr lang="en-GB" sz="1050" b="0" kern="1200" dirty="0">
                               <a:solidFill>
                                 <a:schemeClr val="dk1"/>
                               </a:solidFill>
@@ -3966,7 +3981,7 @@
                             <a:buChar char=""/>
                           </a:pPr>
                           <a:r>
-                            <a:rPr lang="en-GB" sz="1200" b="1" kern="1200" dirty="0">
+                            <a:rPr lang="en-GB" sz="1050" b="1" kern="1200" dirty="0">
                               <a:solidFill>
                                 <a:schemeClr val="dk1"/>
                               </a:solidFill>
@@ -3990,7 +4005,7 @@
                             <a:buChar char=""/>
                           </a:pPr>
                           <a:r>
-                            <a:rPr lang="en-GB" sz="1200" b="0" kern="1200" dirty="0">
+                            <a:rPr lang="en-GB" sz="1050" b="0" kern="1200" dirty="0">
                               <a:solidFill>
                                 <a:srgbClr val="FF0000"/>
                               </a:solidFill>
@@ -4011,7 +4026,7 @@
                       </a:ext>
                     </a:extLst>
                   </a:tr>
-                  <a:tr h="1176114">
+                  <a:tr h="1263824">
                     <a:tc>
                       <a:txBody>
                         <a:bodyPr/>
@@ -4028,7 +4043,7 @@
                             <a:buNone/>
                           </a:pPr>
                           <a:r>
-                            <a:rPr lang="en-GB" sz="1200" dirty="0">
+                            <a:rPr lang="en-GB" sz="1050" dirty="0">
                               <a:effectLst/>
                             </a:rPr>
                             <a:t>Logistic Regression (M1)</a:t>
@@ -4051,7 +4066,7 @@
                                 <m:rPr>
                                   <m:sty m:val="p"/>
                                 </m:rPr>
-                                <a:rPr lang="en-GB" sz="1200" b="0" i="1" kern="1200" smtClean="0">
+                                <a:rPr lang="en-GB" sz="1050" b="0" i="1" kern="1200" smtClean="0">
                                   <a:solidFill>
                                     <a:schemeClr val="dk1"/>
                                   </a:solidFill>
@@ -4063,7 +4078,7 @@
                                 <m:t>y</m:t>
                               </m:r>
                               <m:r>
-                                <a:rPr lang="en-GB" sz="1200" b="0" kern="1200" smtClean="0">
+                                <a:rPr lang="en-GB" sz="1050" b="0" kern="1200" smtClean="0">
                                   <a:solidFill>
                                     <a:schemeClr val="dk1"/>
                                   </a:solidFill>
@@ -4078,7 +4093,7 @@
                                 <m:rPr>
                                   <m:sty m:val="p"/>
                                 </m:rPr>
-                                <a:rPr lang="en-GB" sz="1200" b="0" i="1" kern="1200" smtClean="0">
+                                <a:rPr lang="en-GB" sz="1050" b="0" i="1" kern="1200" smtClean="0">
                                   <a:solidFill>
                                     <a:schemeClr val="dk1"/>
                                   </a:solidFill>
@@ -4090,7 +4105,7 @@
                                 <m:t>mx</m:t>
                               </m:r>
                               <m:r>
-                                <a:rPr lang="en-GB" sz="1200" b="0" kern="1200" smtClean="0">
+                                <a:rPr lang="en-GB" sz="1050" b="0" kern="1200" smtClean="0">
                                   <a:solidFill>
                                     <a:schemeClr val="dk1"/>
                                   </a:solidFill>
@@ -4105,7 +4120,7 @@
                                 <m:rPr>
                                   <m:sty m:val="p"/>
                                 </m:rPr>
-                                <a:rPr lang="en-GB" sz="1200" b="0" i="1" kern="1200" smtClean="0">
+                                <a:rPr lang="en-GB" sz="1050" b="0" i="1" kern="1200" smtClean="0">
                                   <a:solidFill>
                                     <a:schemeClr val="dk1"/>
                                   </a:solidFill>
@@ -4119,7 +4134,7 @@
                             </m:oMath>
                           </a14:m>
                           <a:r>
-                            <a:rPr lang="en-GB" sz="1200" b="0" dirty="0">
+                            <a:rPr lang="en-GB" sz="1050" b="0" dirty="0">
                               <a:effectLst/>
                               <a:latin typeface="Times New Roman" panose="02020603050405020304" pitchFamily="18" charset="0"/>
                               <a:cs typeface="Times New Roman" panose="02020603050405020304" pitchFamily="18" charset="0"/>
@@ -4127,7 +4142,7 @@
                             <a:t> </a:t>
                           </a:r>
                           <a:r>
-                            <a:rPr lang="en-GB" sz="1200" b="0" baseline="0" dirty="0">
+                            <a:rPr lang="en-GB" sz="1050" b="0" baseline="0" dirty="0">
                               <a:effectLst/>
                               <a:latin typeface="Times New Roman" panose="02020603050405020304" pitchFamily="18" charset="0"/>
                               <a:cs typeface="Times New Roman" panose="02020603050405020304" pitchFamily="18" charset="0"/>
@@ -4140,7 +4155,7 @@
                               <m:sSub>
                                 <m:sSubPr>
                                   <m:ctrlPr>
-                                    <a:rPr lang="en-GB" sz="1200" b="0" i="1" baseline="0" smtClean="0">
+                                    <a:rPr lang="en-GB" sz="1050" b="0" i="1" baseline="0" smtClean="0">
                                       <a:effectLst/>
                                       <a:latin typeface="Cambria Math" panose="02040503050406030204" pitchFamily="18" charset="0"/>
                                       <a:sym typeface="Wingdings" panose="05000000000000000000" pitchFamily="2" charset="2"/>
@@ -4152,7 +4167,7 @@
                                     <m:rPr>
                                       <m:sty m:val="p"/>
                                     </m:rPr>
-                                    <a:rPr lang="en-GB" sz="1200" b="0" i="0" baseline="0" smtClean="0">
+                                    <a:rPr lang="en-GB" sz="1050" b="0" i="0" baseline="0" smtClean="0">
                                       <a:effectLst/>
                                       <a:latin typeface="Cambria Math" panose="02040503050406030204" pitchFamily="18" charset="0"/>
                                       <a:sym typeface="Wingdings" panose="05000000000000000000" pitchFamily="2" charset="2"/>
@@ -4162,7 +4177,7 @@
                                 </m:e>
                                 <m:sub>
                                   <m:r>
-                                    <a:rPr lang="en-GB" sz="1200" b="0" i="1" baseline="0" smtClean="0">
+                                    <a:rPr lang="en-GB" sz="1050" b="0" i="1" baseline="0" smtClean="0">
                                       <a:effectLst/>
                                       <a:latin typeface="Cambria Math" panose="02040503050406030204" pitchFamily="18" charset="0"/>
                                       <a:sym typeface="Wingdings" panose="05000000000000000000" pitchFamily="2" charset="2"/>
@@ -4170,7 +4185,7 @@
                                     <m:t>(</m:t>
                                   </m:r>
                                   <m:r>
-                                    <a:rPr lang="en-GB" sz="1200" b="0" i="1" baseline="0" smtClean="0">
+                                    <a:rPr lang="en-GB" sz="1050" b="0" i="1" baseline="0" smtClean="0">
                                       <a:effectLst/>
                                       <a:latin typeface="Cambria Math" panose="02040503050406030204" pitchFamily="18" charset="0"/>
                                       <a:sym typeface="Wingdings" panose="05000000000000000000" pitchFamily="2" charset="2"/>
@@ -4178,7 +4193,7 @@
                                     <m:t>𝑦</m:t>
                                   </m:r>
                                   <m:r>
-                                    <a:rPr lang="en-GB" sz="1200" b="0" i="1" baseline="0" smtClean="0">
+                                    <a:rPr lang="en-GB" sz="1050" b="0" i="1" baseline="0" smtClean="0">
                                       <a:effectLst/>
                                       <a:latin typeface="Cambria Math" panose="02040503050406030204" pitchFamily="18" charset="0"/>
                                       <a:sym typeface="Wingdings" panose="05000000000000000000" pitchFamily="2" charset="2"/>
@@ -4188,7 +4203,7 @@
                                 </m:sub>
                               </m:sSub>
                               <m:r>
-                                <a:rPr lang="en-GB" sz="1200" b="0" i="1" baseline="0" smtClean="0">
+                                <a:rPr lang="en-GB" sz="1050" b="0" i="1" baseline="0" smtClean="0">
                                   <a:effectLst/>
                                   <a:latin typeface="Cambria Math" panose="02040503050406030204" pitchFamily="18" charset="0"/>
                                   <a:sym typeface="Wingdings" panose="05000000000000000000" pitchFamily="2" charset="2"/>
@@ -4198,7 +4213,7 @@
                               <m:f>
                                 <m:fPr>
                                   <m:ctrlPr>
-                                    <a:rPr lang="en-GB" sz="1200" b="0" i="1" baseline="0" smtClean="0">
+                                    <a:rPr lang="en-GB" sz="1050" b="0" i="1" baseline="0" smtClean="0">
                                       <a:effectLst/>
                                       <a:latin typeface="Cambria Math" panose="02040503050406030204" pitchFamily="18" charset="0"/>
                                       <a:sym typeface="Wingdings" panose="05000000000000000000" pitchFamily="2" charset="2"/>
@@ -4207,7 +4222,7 @@
                                 </m:fPr>
                                 <m:num>
                                   <m:r>
-                                    <a:rPr lang="en-GB" sz="1200" b="0" i="1" baseline="0" smtClean="0">
+                                    <a:rPr lang="en-GB" sz="1050" b="0" i="1" baseline="0" smtClean="0">
                                       <a:effectLst/>
                                       <a:latin typeface="Cambria Math" panose="02040503050406030204" pitchFamily="18" charset="0"/>
                                       <a:sym typeface="Wingdings" panose="05000000000000000000" pitchFamily="2" charset="2"/>
@@ -4217,7 +4232,7 @@
                                 </m:num>
                                 <m:den>
                                   <m:r>
-                                    <a:rPr lang="en-GB" sz="1200" b="0" i="1" baseline="0" smtClean="0">
+                                    <a:rPr lang="en-GB" sz="1050" b="0" i="1" baseline="0" smtClean="0">
                                       <a:effectLst/>
                                       <a:latin typeface="Cambria Math" panose="02040503050406030204" pitchFamily="18" charset="0"/>
                                       <a:sym typeface="Wingdings" panose="05000000000000000000" pitchFamily="2" charset="2"/>
@@ -4227,7 +4242,7 @@
                                   <m:sSup>
                                     <m:sSupPr>
                                       <m:ctrlPr>
-                                        <a:rPr lang="en-GB" sz="1200" b="0" i="1" baseline="0" smtClean="0">
+                                        <a:rPr lang="en-GB" sz="1050" b="0" i="1" baseline="0" smtClean="0">
                                           <a:effectLst/>
                                           <a:latin typeface="Cambria Math" panose="02040503050406030204" pitchFamily="18" charset="0"/>
                                           <a:sym typeface="Wingdings" panose="05000000000000000000" pitchFamily="2" charset="2"/>
@@ -4236,7 +4251,7 @@
                                     </m:sSupPr>
                                     <m:e>
                                       <m:r>
-                                        <a:rPr lang="en-GB" sz="1200" b="0" i="1" baseline="0" smtClean="0">
+                                        <a:rPr lang="en-GB" sz="1050" b="0" i="1" baseline="0" smtClean="0">
                                           <a:effectLst/>
                                           <a:latin typeface="Cambria Math" panose="02040503050406030204" pitchFamily="18" charset="0"/>
                                           <a:sym typeface="Wingdings" panose="05000000000000000000" pitchFamily="2" charset="2"/>
@@ -4246,7 +4261,7 @@
                                     </m:e>
                                     <m:sup>
                                       <m:r>
-                                        <a:rPr lang="en-GB" sz="1200" b="0" i="1" baseline="0" smtClean="0">
+                                        <a:rPr lang="en-GB" sz="1050" b="0" i="1" baseline="0" smtClean="0">
                                           <a:effectLst/>
                                           <a:latin typeface="Cambria Math" panose="02040503050406030204" pitchFamily="18" charset="0"/>
                                           <a:sym typeface="Wingdings" panose="05000000000000000000" pitchFamily="2" charset="2"/>
@@ -4254,7 +4269,7 @@
                                         <m:t> </m:t>
                                       </m:r>
                                       <m:r>
-                                        <a:rPr lang="en-GB" sz="1200" b="0" i="1" baseline="0" smtClean="0">
+                                        <a:rPr lang="en-GB" sz="1050" b="0" i="1" baseline="0" smtClean="0">
                                           <a:effectLst/>
                                           <a:latin typeface="Cambria Math" panose="02040503050406030204" pitchFamily="18" charset="0"/>
                                           <a:sym typeface="Wingdings" panose="05000000000000000000" pitchFamily="2" charset="2"/>
@@ -4262,7 +4277,7 @@
                                         <m:t>𝑚𝑥</m:t>
                                       </m:r>
                                       <m:r>
-                                        <a:rPr lang="en-GB" sz="1200" b="0" i="1" baseline="0" smtClean="0">
+                                        <a:rPr lang="en-GB" sz="1050" b="0" i="1" baseline="0" smtClean="0">
                                           <a:effectLst/>
                                           <a:latin typeface="Cambria Math" panose="02040503050406030204" pitchFamily="18" charset="0"/>
                                           <a:sym typeface="Wingdings" panose="05000000000000000000" pitchFamily="2" charset="2"/>
@@ -4270,7 +4285,7 @@
                                         <m:t>+</m:t>
                                       </m:r>
                                       <m:r>
-                                        <a:rPr lang="en-GB" sz="1200" b="0" i="1" baseline="0" smtClean="0">
+                                        <a:rPr lang="en-GB" sz="1050" b="0" i="1" baseline="0" smtClean="0">
                                           <a:effectLst/>
                                           <a:latin typeface="Cambria Math" panose="02040503050406030204" pitchFamily="18" charset="0"/>
                                           <a:sym typeface="Wingdings" panose="05000000000000000000" pitchFamily="2" charset="2"/>
@@ -4280,7 +4295,7 @@
                                     </m:sup>
                                   </m:sSup>
                                   <m:r>
-                                    <a:rPr lang="en-GB" sz="1200" b="0" i="1" baseline="0" smtClean="0">
+                                    <a:rPr lang="en-GB" sz="1050" b="0" i="1" baseline="0" smtClean="0">
                                       <a:effectLst/>
                                       <a:latin typeface="Cambria Math" panose="02040503050406030204" pitchFamily="18" charset="0"/>
                                       <a:sym typeface="Wingdings" panose="05000000000000000000" pitchFamily="2" charset="2"/>
@@ -4291,7 +4306,7 @@
                               </m:f>
                             </m:oMath>
                           </a14:m>
-                          <a:endParaRPr lang="en-GB" sz="1200" b="0" dirty="0">
+                          <a:endParaRPr lang="en-GB" sz="1050" b="0" dirty="0">
                             <a:effectLst/>
                             <a:latin typeface="Times New Roman" panose="02020603050405020304" pitchFamily="18" charset="0"/>
                             <a:cs typeface="Times New Roman" panose="02020603050405020304" pitchFamily="18" charset="0"/>
@@ -4309,7 +4324,7 @@
                             <a:buChar char=""/>
                           </a:pPr>
                           <a:r>
-                            <a:rPr lang="en-GB" sz="1200" b="0" dirty="0">
+                            <a:rPr lang="en-GB" sz="1050" b="0" dirty="0">
                               <a:effectLst/>
                               <a:latin typeface="Times New Roman" panose="02020603050405020304" pitchFamily="18" charset="0"/>
                               <a:cs typeface="Times New Roman" panose="02020603050405020304" pitchFamily="18" charset="0"/>
@@ -4329,7 +4344,7 @@
                             <a:buChar char=""/>
                           </a:pPr>
                           <a:r>
-                            <a:rPr lang="en-GB" sz="1200" b="0" dirty="0">
+                            <a:rPr lang="en-GB" sz="1050" b="0" dirty="0">
                               <a:effectLst/>
                             </a:rPr>
                             <a:t>Apply s-shaped logistic function to linear regression.</a:t>
@@ -4354,7 +4369,7 @@
                             <a:buNone/>
                           </a:pPr>
                           <a:r>
-                            <a:rPr lang="en-GB" sz="1200" b="1" dirty="0">
+                            <a:rPr lang="en-GB" sz="1050" b="1" dirty="0">
                               <a:solidFill>
                                 <a:srgbClr val="FF0000"/>
                               </a:solidFill>
@@ -4375,16 +4390,10 @@
                             <a:buChar char=""/>
                           </a:pPr>
                           <a:r>
-                            <a:rPr lang="en-GB" sz="1200">
-                              <a:effectLst/>
-                            </a:rPr>
-                            <a:t>Probabilistic </a:t>
-                          </a:r>
-                          <a:r>
-                            <a:rPr lang="en-GB" sz="1200" dirty="0">
-                              <a:effectLst/>
-                            </a:rPr>
-                            <a:t>dimensionality reduction technique.</a:t>
+                            <a:rPr lang="en-GB" sz="1050" dirty="0">
+                              <a:effectLst/>
+                            </a:rPr>
+                            <a:t>Probabilistic dimensionality reduction technique.</a:t>
                           </a:r>
                         </a:p>
                         <a:p>
@@ -4399,7 +4408,7 @@
                             <a:buChar char=""/>
                           </a:pPr>
                           <a:r>
-                            <a:rPr lang="en-GB" sz="1200" dirty="0">
+                            <a:rPr lang="en-GB" sz="1050" dirty="0">
                               <a:effectLst/>
                             </a:rPr>
                             <a:t>Captures complex polynomial relationships</a:t>
@@ -4417,7 +4426,7 @@
                             <a:buChar char=""/>
                           </a:pPr>
                           <a:r>
-                            <a:rPr lang="en-GB" sz="1200" dirty="0">
+                            <a:rPr lang="en-GB" sz="1050" dirty="0">
                               <a:effectLst/>
                             </a:rPr>
                             <a:t>Resulting in clearer clusters.</a:t>
@@ -4442,7 +4451,7 @@
                             <a:buNone/>
                           </a:pPr>
                           <a:r>
-                            <a:rPr lang="en-GB" sz="1200" b="1" dirty="0">
+                            <a:rPr lang="en-GB" sz="1050" b="1" dirty="0">
                               <a:solidFill>
                                 <a:srgbClr val="FF0000"/>
                               </a:solidFill>
@@ -4463,7 +4472,7 @@
                             <a:buChar char=""/>
                           </a:pPr>
                           <a:r>
-                            <a:rPr lang="en-GB" sz="1200" dirty="0">
+                            <a:rPr lang="en-GB" sz="1050" dirty="0">
                               <a:effectLst/>
                             </a:rPr>
                             <a:t>Applied on PCs</a:t>
@@ -4481,12 +4490,83 @@
                             <a:buChar char=""/>
                           </a:pPr>
                           <a:r>
-                            <a:rPr lang="en-GB" sz="1200" dirty="0">
+                            <a:rPr lang="en-GB" sz="1050" dirty="0">
                               <a:effectLst/>
                             </a:rPr>
                             <a:t>Decided on 10 clusters</a:t>
                           </a:r>
-                          <a:endParaRPr lang="en-GB" dirty="0"/>
+                        </a:p>
+                        <a:p>
+                          <a:pPr marL="0" marR="0" lvl="0" indent="0" algn="l" defTabSz="914400" rtl="0" eaLnBrk="1" fontAlgn="auto" latinLnBrk="0" hangingPunct="1">
+                            <a:lnSpc>
+                              <a:spcPct val="100000"/>
+                            </a:lnSpc>
+                            <a:spcBef>
+                              <a:spcPts val="0"/>
+                            </a:spcBef>
+                            <a:spcAft>
+                              <a:spcPts val="0"/>
+                            </a:spcAft>
+                            <a:buClrTx/>
+                            <a:buSzTx/>
+                            <a:buFontTx/>
+                            <a:buNone/>
+                            <a:tabLst/>
+                            <a:defRPr/>
+                          </a:pPr>
+                          <a:r>
+                            <a:rPr kumimoji="0" lang="en-GB" sz="1050" b="0" i="0" u="none" strike="noStrike" kern="1200" cap="none" spc="0" normalizeH="0" baseline="0" noProof="0" dirty="0">
+                              <a:ln>
+                                <a:noFill/>
+                              </a:ln>
+                              <a:solidFill>
+                                <a:prstClr val="black"/>
+                              </a:solidFill>
+                              <a:effectLst/>
+                              <a:uLnTx/>
+                              <a:uFillTx/>
+                              <a:latin typeface="+mn-lt"/>
+                              <a:ea typeface="+mn-ea"/>
+                              <a:cs typeface="+mn-cs"/>
+                            </a:rPr>
+                            <a:t>- Enough subgroups to differentiate behaviour, not too many.</a:t>
+                          </a:r>
+                        </a:p>
+                        <a:p>
+                          <a:pPr marL="0" marR="0" lvl="0" indent="0" algn="l" defTabSz="914400" rtl="0" eaLnBrk="1" fontAlgn="auto" latinLnBrk="0" hangingPunct="1">
+                            <a:lnSpc>
+                              <a:spcPct val="100000"/>
+                            </a:lnSpc>
+                            <a:spcBef>
+                              <a:spcPts val="0"/>
+                            </a:spcBef>
+                            <a:spcAft>
+                              <a:spcPts val="0"/>
+                            </a:spcAft>
+                            <a:buClrTx/>
+                            <a:buSzTx/>
+                            <a:buFontTx/>
+                            <a:buNone/>
+                            <a:tabLst/>
+                            <a:defRPr/>
+                          </a:pPr>
+                          <a:r>
+                            <a:rPr kumimoji="0" lang="en-GB" sz="1050" b="0" i="0" u="none" strike="noStrike" kern="1200" cap="none" spc="0" normalizeH="0" baseline="0" noProof="0" dirty="0">
+                              <a:ln>
+                                <a:noFill/>
+                              </a:ln>
+                              <a:solidFill>
+                                <a:prstClr val="black"/>
+                              </a:solidFill>
+                              <a:effectLst/>
+                              <a:uLnTx/>
+                              <a:uFillTx/>
+                              <a:latin typeface="+mn-lt"/>
+                              <a:ea typeface="+mn-ea"/>
+                              <a:cs typeface="+mn-cs"/>
+                            </a:rPr>
+                            <a:t>- K-Means on t-SNE features lends to easier visual interpretation.</a:t>
+                          </a:r>
                         </a:p>
                       </a:txBody>
                       <a:tcPr marL="49480" marR="49480" marT="0" marB="0"/>
@@ -4496,7 +4576,7 @@
                         <a:bodyPr/>
                         <a:lstStyle/>
                         <a:p>
-                          <a:endParaRPr lang="en-GB" dirty="0"/>
+                          <a:endParaRPr lang="en-GB" sz="1050" dirty="0"/>
                         </a:p>
                       </a:txBody>
                       <a:tcPr marL="49480" marR="49480" marT="0" marB="0"/>
@@ -4507,7 +4587,7 @@
                       </a:ext>
                     </a:extLst>
                   </a:tr>
-                  <a:tr h="1351657">
+                  <a:tr h="1568611">
                     <a:tc gridSpan="4">
                       <a:txBody>
                         <a:bodyPr/>
@@ -4534,7 +4614,7 @@
                               <a:spcPct val="107000"/>
                             </a:lnSpc>
                             <a:spcAft>
-                              <a:spcPts val="0"/>
+                              <a:spcPts val="300"/>
                             </a:spcAft>
                           </a:pPr>
                           <a:r>
@@ -4547,29 +4627,51 @@
                               <a:ea typeface="+mn-ea"/>
                               <a:cs typeface="+mn-cs"/>
                             </a:rPr>
-                            <a:t>- Alternative H1 proven correct. Historically, certain subgroups of trades were considerably more profitable. Their profitability fluctuated with time. This approach is better than placing a flat threshold on classification accuracy (all unprofitable). Subgroups differ mostly by type of action (Long/Short), the most profitable group (1) was comprised of 222 Long trades.</a:t>
-                          </a:r>
-                        </a:p>
-                        <a:p>
-                          <a:pPr algn="l">
+                            <a:t>- Alternative </a:t>
+                          </a:r>
+                          <a:r>
+                            <a:rPr lang="en-GB" sz="1200" b="1" i="1" kern="1200" dirty="0">
+                              <a:solidFill>
+                                <a:srgbClr val="0070C0"/>
+                              </a:solidFill>
+                              <a:effectLst/>
+                              <a:latin typeface="+mn-lt"/>
+                              <a:ea typeface="+mn-ea"/>
+                              <a:cs typeface="+mn-cs"/>
+                            </a:rPr>
+                            <a:t>H1 proven correct</a:t>
+                          </a:r>
+                          <a:r>
+                            <a:rPr lang="en-GB" sz="1200" b="0" kern="1200" dirty="0">
+                              <a:solidFill>
+                                <a:schemeClr val="dk1"/>
+                              </a:solidFill>
+                              <a:effectLst/>
+                              <a:latin typeface="+mn-lt"/>
+                              <a:ea typeface="+mn-ea"/>
+                              <a:cs typeface="+mn-cs"/>
+                            </a:rPr>
+                            <a:t>. Historically, certain subgroups of trades were considerably more profitable. Their profitability fluctuated with time. This approach is better than placing a flat threshold on classification accuracy (all unprofitable). Subgroups differ mostly by type of action (Long/Short), the most profitable group (1) was comprised of 222 Long trades.</a:t>
+                          </a:r>
+                        </a:p>
+                        <a:p>
+                          <a:pPr marL="0" marR="0" lvl="0" indent="0" algn="l" defTabSz="914400" rtl="0" eaLnBrk="1" fontAlgn="auto" latinLnBrk="0" hangingPunct="1">
                             <a:lnSpc>
                               <a:spcPct val="107000"/>
                             </a:lnSpc>
-                            <a:spcAft>
-                              <a:spcPts val="0"/>
-                            </a:spcAft>
-                          </a:pPr>
-                          <a:endParaRPr lang="en-GB" sz="1200" b="0" kern="1200" dirty="0">
-                            <a:solidFill>
-                              <a:schemeClr val="dk1"/>
-                            </a:solidFill>
-                            <a:effectLst/>
-                            <a:latin typeface="+mn-lt"/>
-                            <a:ea typeface="+mn-ea"/>
-                            <a:cs typeface="+mn-cs"/>
-                          </a:endParaRPr>
-                        </a:p>
-                        <a:p>
+                            <a:spcBef>
+                              <a:spcPts val="0"/>
+                            </a:spcBef>
+                            <a:spcAft>
+                              <a:spcPts val="0"/>
+                            </a:spcAft>
+                            <a:buClrTx/>
+                            <a:buSzTx/>
+                            <a:buFontTx/>
+                            <a:buNone/>
+                            <a:tabLst/>
+                            <a:defRPr/>
+                          </a:pPr>
                           <a:r>
                             <a:rPr lang="en-GB" sz="1200" b="0" kern="1200" dirty="0">
                               <a:solidFill>
@@ -4580,10 +4682,44 @@
                               <a:ea typeface="+mn-ea"/>
                               <a:cs typeface="+mn-cs"/>
                             </a:rPr>
-                            <a:t>- K-means want to enough subgroups to differentiate behaviour, but large enough to trade</a:t>
-                          </a:r>
-                        </a:p>
-                        <a:p>
+                            <a:t>- Alternative </a:t>
+                          </a:r>
+                          <a:r>
+                            <a:rPr lang="en-GB" sz="1200" b="1" i="1" kern="1200" dirty="0">
+                              <a:solidFill>
+                                <a:srgbClr val="0070C0"/>
+                              </a:solidFill>
+                              <a:effectLst/>
+                              <a:latin typeface="+mn-lt"/>
+                              <a:ea typeface="+mn-ea"/>
+                              <a:cs typeface="+mn-cs"/>
+                            </a:rPr>
+                            <a:t>H2 proven correct</a:t>
+                          </a:r>
+                          <a:r>
+                            <a:rPr lang="en-GB" sz="1200" b="0" i="0" kern="1200" dirty="0">
+                              <a:solidFill>
+                                <a:srgbClr val="0070C0"/>
+                              </a:solidFill>
+                              <a:effectLst/>
+                              <a:latin typeface="+mn-lt"/>
+                              <a:ea typeface="+mn-ea"/>
+                              <a:cs typeface="+mn-cs"/>
+                            </a:rPr>
+                            <a:t> </a:t>
+                          </a:r>
+                          <a:r>
+                            <a:rPr lang="en-GB" sz="1200" b="0" i="0" kern="1200" dirty="0">
+                              <a:solidFill>
+                                <a:schemeClr val="dk1"/>
+                              </a:solidFill>
+                              <a:effectLst/>
+                              <a:latin typeface="+mn-lt"/>
+                              <a:ea typeface="+mn-ea"/>
+                              <a:cs typeface="+mn-cs"/>
+                            </a:rPr>
+                            <a:t>with 70 trade sample</a:t>
+                          </a:r>
                           <a:r>
                             <a:rPr lang="en-GB" sz="1200" b="0" kern="1200" dirty="0">
                               <a:solidFill>
@@ -4594,14 +4730,184 @@
                               <a:ea typeface="+mn-ea"/>
                               <a:cs typeface="+mn-cs"/>
                             </a:rPr>
-                            <a:t>- K-Means on t-SNE features lends to easier visual interpretation_</a:t>
-                          </a:r>
-                        </a:p>
-                        <a:p>
-                          <a:endParaRPr lang="en-GB" sz="1200" dirty="0"/>
-                        </a:p>
-                        <a:p>
-                          <a:endParaRPr lang="en-GB" dirty="0"/>
+                            <a:t>. Using model predictions &amp; analyst judgement -&gt; reduced max loss by $30, raised max win by $20, accuracy +3% vs model, profitability +174%.  Trading only when </a:t>
+                          </a:r>
+                          <a:r>
+                            <a:rPr lang="en-GB" sz="1200" b="0" kern="1200" dirty="0" err="1">
+                              <a:solidFill>
+                                <a:schemeClr val="dk1"/>
+                              </a:solidFill>
+                              <a:effectLst/>
+                              <a:latin typeface="+mn-lt"/>
+                              <a:ea typeface="+mn-ea"/>
+                              <a:cs typeface="+mn-cs"/>
+                            </a:rPr>
+                            <a:t>model&amp;analyst</a:t>
+                          </a:r>
+                          <a:r>
+                            <a:rPr lang="en-GB" sz="1200" b="0" kern="1200" dirty="0">
+                              <a:solidFill>
+                                <a:schemeClr val="dk1"/>
+                              </a:solidFill>
+                              <a:effectLst/>
+                              <a:latin typeface="+mn-lt"/>
+                              <a:ea typeface="+mn-ea"/>
+                              <a:cs typeface="+mn-cs"/>
+                            </a:rPr>
+                            <a:t> predictions match </a:t>
+                          </a:r>
+                          <a:r>
+                            <a:rPr lang="en-GB" sz="1200" b="0" kern="1200" dirty="0">
+                              <a:solidFill>
+                                <a:schemeClr val="dk1"/>
+                              </a:solidFill>
+                              <a:effectLst/>
+                              <a:latin typeface="+mn-lt"/>
+                              <a:ea typeface="+mn-ea"/>
+                              <a:cs typeface="+mn-cs"/>
+                              <a:sym typeface="Wingdings" panose="05000000000000000000" pitchFamily="2" charset="2"/>
+                            </a:rPr>
+                            <a:t>-&gt;</a:t>
+                          </a:r>
+                          <a:r>
+                            <a:rPr lang="en-GB" sz="1200" b="0" kern="1200" dirty="0">
+                              <a:solidFill>
+                                <a:schemeClr val="dk1"/>
+                              </a:solidFill>
+                              <a:effectLst/>
+                              <a:latin typeface="+mn-lt"/>
+                              <a:ea typeface="+mn-ea"/>
+                              <a:cs typeface="+mn-cs"/>
+                            </a:rPr>
+                            <a:t> reduced trades to 39, accuracy +11.5% vs model, profitability +174%, -trading pattern like model, reduced max loss by $30, no change max win.</a:t>
+                          </a:r>
+                        </a:p>
+                        <a:p>
+                          <a:pPr marL="0" marR="0" lvl="0" indent="0" algn="l" defTabSz="914400" rtl="0" eaLnBrk="1" fontAlgn="auto" latinLnBrk="0" hangingPunct="1">
+                            <a:lnSpc>
+                              <a:spcPct val="107000"/>
+                            </a:lnSpc>
+                            <a:spcBef>
+                              <a:spcPts val="0"/>
+                            </a:spcBef>
+                            <a:spcAft>
+                              <a:spcPts val="0"/>
+                            </a:spcAft>
+                            <a:buClrTx/>
+                            <a:buSzTx/>
+                            <a:buFontTx/>
+                            <a:buNone/>
+                            <a:tabLst/>
+                            <a:defRPr/>
+                          </a:pPr>
+                          <a:r>
+                            <a:rPr lang="en-GB" sz="1200" b="0" kern="1200" dirty="0">
+                              <a:solidFill>
+                                <a:schemeClr val="dk1"/>
+                              </a:solidFill>
+                              <a:effectLst/>
+                              <a:latin typeface="+mn-lt"/>
+                              <a:ea typeface="+mn-ea"/>
+                              <a:cs typeface="+mn-cs"/>
+                            </a:rPr>
+                            <a:t>- Evaluated hybrid-trading on unseen data 2010-11, forecasted actions &amp; cluster group. Model accuracy fell to 43%. </a:t>
+                          </a:r>
+                          <a:r>
+                            <a:rPr lang="en-GB" sz="1200" b="1" kern="1200" dirty="0">
+                              <a:solidFill>
+                                <a:schemeClr val="dk1"/>
+                              </a:solidFill>
+                              <a:effectLst/>
+                              <a:latin typeface="+mn-lt"/>
+                              <a:ea typeface="+mn-ea"/>
+                              <a:cs typeface="+mn-cs"/>
+                            </a:rPr>
+                            <a:t>Profitability of clusters changed –affected performance</a:t>
+                          </a:r>
+                          <a:r>
+                            <a:rPr lang="en-GB" sz="1200" b="0" kern="1200" dirty="0">
+                              <a:solidFill>
+                                <a:schemeClr val="dk1"/>
+                              </a:solidFill>
+                              <a:effectLst/>
+                              <a:latin typeface="+mn-lt"/>
+                              <a:ea typeface="+mn-ea"/>
+                              <a:cs typeface="+mn-cs"/>
+                            </a:rPr>
+                            <a:t>. However certain clusters remained more profitable (</a:t>
+                          </a:r>
+                          <a:r>
+                            <a:rPr lang="en-GB" sz="1200" b="1" kern="1200" dirty="0">
+                              <a:solidFill>
+                                <a:schemeClr val="dk1"/>
+                              </a:solidFill>
+                              <a:effectLst/>
+                              <a:latin typeface="+mn-lt"/>
+                              <a:ea typeface="+mn-ea"/>
+                              <a:cs typeface="+mn-cs"/>
+                            </a:rPr>
+                            <a:t>H1</a:t>
+                          </a:r>
+                          <a:r>
+                            <a:rPr lang="en-GB" sz="1200" b="0" kern="1200" dirty="0">
+                              <a:solidFill>
+                                <a:schemeClr val="dk1"/>
+                              </a:solidFill>
+                              <a:effectLst/>
+                              <a:latin typeface="+mn-lt"/>
+                              <a:ea typeface="+mn-ea"/>
+                              <a:cs typeface="+mn-cs"/>
+                            </a:rPr>
+                            <a:t> stands). Hybrid trading &gt; model based, particularly </a:t>
+                          </a:r>
+                          <a:r>
+                            <a:rPr lang="en-GB" sz="1200" b="1" kern="1200" dirty="0">
+                              <a:solidFill>
+                                <a:schemeClr val="dk1"/>
+                              </a:solidFill>
+                              <a:effectLst/>
+                              <a:latin typeface="+mn-lt"/>
+                              <a:ea typeface="+mn-ea"/>
+                              <a:cs typeface="+mn-cs"/>
+                            </a:rPr>
+                            <a:t>Hybrid-Match</a:t>
+                          </a:r>
+                          <a:r>
+                            <a:rPr lang="en-GB" sz="1200" b="0" kern="1200" dirty="0">
+                              <a:solidFill>
+                                <a:schemeClr val="dk1"/>
+                              </a:solidFill>
+                              <a:effectLst/>
+                              <a:latin typeface="+mn-lt"/>
+                              <a:ea typeface="+mn-ea"/>
+                              <a:cs typeface="+mn-cs"/>
+                            </a:rPr>
+                            <a:t>(</a:t>
+                          </a:r>
+                          <a:r>
+                            <a:rPr lang="en-GB" sz="1200" b="1" kern="1200" dirty="0">
+                              <a:solidFill>
+                                <a:schemeClr val="dk1"/>
+                              </a:solidFill>
+                              <a:effectLst/>
+                              <a:latin typeface="+mn-lt"/>
+                              <a:ea typeface="+mn-ea"/>
+                              <a:cs typeface="+mn-cs"/>
+                            </a:rPr>
+                            <a:t>H2</a:t>
+                          </a:r>
+                          <a:r>
+                            <a:rPr lang="en-GB" sz="1200" b="0" kern="1200" dirty="0">
+                              <a:solidFill>
+                                <a:schemeClr val="dk1"/>
+                              </a:solidFill>
+                              <a:effectLst/>
+                              <a:latin typeface="+mn-lt"/>
+                              <a:ea typeface="+mn-ea"/>
+                              <a:cs typeface="+mn-cs"/>
+                            </a:rPr>
+                            <a:t>). Both model and analyst capture unique insight. Ensemble approach superior.</a:t>
+                          </a:r>
                         </a:p>
                       </a:txBody>
                       <a:tcPr marL="49480" marR="49480" marT="0" marB="0"/>
@@ -4663,14 +4969,14 @@
               <p:nvPr>
                 <p:extLst>
                   <p:ext uri="{D42A27DB-BD31-4B8C-83A1-F6EECF244321}">
-                    <p14:modId xmlns:p14="http://schemas.microsoft.com/office/powerpoint/2010/main" val="2286047102"/>
+                    <p14:modId xmlns:p14="http://schemas.microsoft.com/office/powerpoint/2010/main" val="2961576876"/>
                   </p:ext>
                 </p:extLst>
               </p:nvPr>
             </p:nvGraphicFramePr>
             <p:xfrm>
-              <a:off x="101600" y="91440"/>
-              <a:ext cx="11988801" cy="6909223"/>
+              <a:off x="91440" y="62145"/>
+              <a:ext cx="11998961" cy="6726959"/>
             </p:xfrm>
             <a:graphic>
               <a:graphicData uri="http://schemas.openxmlformats.org/drawingml/2006/table">
@@ -4679,28 +4985,28 @@
                     <a:tableStyleId>{69CF1AB2-1976-4502-BF36-3FF5EA218861}</a:tableStyleId>
                   </a:tblPr>
                   <a:tblGrid>
-                    <a:gridCol w="4088660">
+                    <a:gridCol w="3821865">
                       <a:extLst>
                         <a:ext uri="{9D8B030D-6E8A-4147-A177-3AD203B41FA5}">
                           <a16:colId xmlns:a16="http://schemas.microsoft.com/office/drawing/2014/main" val="617989892"/>
                         </a:ext>
                       </a:extLst>
                     </a:gridCol>
-                    <a:gridCol w="2476758">
+                    <a:gridCol w="2563586">
                       <a:extLst>
                         <a:ext uri="{9D8B030D-6E8A-4147-A177-3AD203B41FA5}">
                           <a16:colId xmlns:a16="http://schemas.microsoft.com/office/drawing/2014/main" val="705446048"/>
                         </a:ext>
                       </a:extLst>
                     </a:gridCol>
-                    <a:gridCol w="2696901">
+                    <a:gridCol w="2791446">
                       <a:extLst>
                         <a:ext uri="{9D8B030D-6E8A-4147-A177-3AD203B41FA5}">
                           <a16:colId xmlns:a16="http://schemas.microsoft.com/office/drawing/2014/main" val="2819006588"/>
                         </a:ext>
                       </a:extLst>
                     </a:gridCol>
-                    <a:gridCol w="2726482">
+                    <a:gridCol w="2822064">
                       <a:extLst>
                         <a:ext uri="{9D8B030D-6E8A-4147-A177-3AD203B41FA5}">
                           <a16:colId xmlns:a16="http://schemas.microsoft.com/office/drawing/2014/main" val="3759442639"/>
@@ -4708,7 +5014,7 @@
                       </a:extLst>
                     </a:gridCol>
                   </a:tblGrid>
-                  <a:tr h="628819">
+                  <a:tr h="579087">
                     <a:tc gridSpan="4">
                       <a:txBody>
                         <a:bodyPr/>
@@ -4998,7 +5304,7 @@
                       </a:ext>
                     </a:extLst>
                   </a:tr>
-                  <a:tr h="1880489">
+                  <a:tr h="1744354">
                     <a:tc>
                       <a:txBody>
                         <a:bodyPr/>
@@ -5015,7 +5321,7 @@
                             <a:buNone/>
                           </a:pPr>
                           <a:r>
-                            <a:rPr lang="en-GB" sz="1200" b="1" kern="1200" dirty="0">
+                            <a:rPr lang="en-GB" sz="1050" b="1" kern="1200" dirty="0">
                               <a:solidFill>
                                 <a:schemeClr val="dk1"/>
                               </a:solidFill>
@@ -5039,7 +5345,7 @@
                             <a:buChar char=""/>
                           </a:pPr>
                           <a:r>
-                            <a:rPr lang="en-GB" sz="1200" b="0" kern="1200" dirty="0">
+                            <a:rPr lang="en-GB" sz="1050" b="0" kern="1200" dirty="0">
                               <a:solidFill>
                                 <a:schemeClr val="dk1"/>
                               </a:solidFill>
@@ -5063,193 +5369,24 @@
                             <a:buChar char=""/>
                           </a:pPr>
                           <a:r>
-                            <a:rPr lang="en-GB" sz="1200" b="0" kern="1200" dirty="0">
-                              <a:solidFill>
-                                <a:schemeClr val="dk1"/>
-                              </a:solidFill>
-                              <a:effectLst/>
-                              <a:latin typeface="+mn-lt"/>
-                              <a:ea typeface="+mn-ea"/>
-                              <a:cs typeface="+mn-cs"/>
-                            </a:rPr>
-                            <a:t>Daily data. Daily trading. </a:t>
-                          </a:r>
-                        </a:p>
-                        <a:p>
-                          <a:pPr marL="342900" lvl="0" indent="-342900" algn="l">
-                            <a:lnSpc>
-                              <a:spcPct val="115000"/>
-                            </a:lnSpc>
-                            <a:spcAft>
-                              <a:spcPts val="0"/>
-                            </a:spcAft>
-                            <a:buFont typeface="Wingdings" panose="05000000000000000000" pitchFamily="2" charset="2"/>
-                            <a:buChar char=""/>
-                          </a:pPr>
-                          <a:r>
-                            <a:rPr lang="en-GB" sz="1200" b="0" kern="1200" dirty="0">
-                              <a:solidFill>
-                                <a:schemeClr val="dk1"/>
-                              </a:solidFill>
-                              <a:effectLst/>
-                              <a:latin typeface="+mn-lt"/>
-                              <a:ea typeface="+mn-ea"/>
-                              <a:cs typeface="+mn-cs"/>
-                            </a:rPr>
-                            <a:t>Starting balance $10,000, position $5,000</a:t>
-                          </a:r>
-                        </a:p>
-                        <a:p>
-                          <a:pPr marL="342900" lvl="0" indent="-342900" algn="l">
-                            <a:lnSpc>
-                              <a:spcPct val="115000"/>
-                            </a:lnSpc>
-                            <a:spcAft>
-                              <a:spcPts val="0"/>
-                            </a:spcAft>
-                            <a:buFont typeface="Wingdings" panose="05000000000000000000" pitchFamily="2" charset="2"/>
-                            <a:buChar char=""/>
-                          </a:pPr>
-                          <a:r>
-                            <a:rPr lang="en-GB" sz="1200" b="0" kern="1200" dirty="0">
-                              <a:solidFill>
-                                <a:schemeClr val="dk1"/>
-                              </a:solidFill>
-                              <a:effectLst/>
-                              <a:latin typeface="+mn-lt"/>
-                              <a:ea typeface="+mn-ea"/>
-                              <a:cs typeface="+mn-cs"/>
-                            </a:rPr>
-                            <a:t>1 step-ahead forecasting</a:t>
-                          </a:r>
-                        </a:p>
-                        <a:p>
-                          <a:pPr marL="342900" lvl="0" indent="-342900" algn="l">
-                            <a:lnSpc>
-                              <a:spcPct val="115000"/>
-                            </a:lnSpc>
-                            <a:spcAft>
-                              <a:spcPts val="0"/>
-                            </a:spcAft>
-                            <a:buFont typeface="Wingdings" panose="05000000000000000000" pitchFamily="2" charset="2"/>
-                            <a:buChar char=""/>
-                          </a:pPr>
-                          <a:r>
-                            <a:rPr lang="en-GB" sz="1200" b="0" kern="1200" dirty="0">
-                              <a:solidFill>
-                                <a:schemeClr val="dk1"/>
-                              </a:solidFill>
-                              <a:effectLst/>
-                              <a:latin typeface="+mn-lt"/>
-                              <a:ea typeface="+mn-ea"/>
-                              <a:cs typeface="+mn-cs"/>
-                            </a:rPr>
-                            <a:t>Using a 10day rolling window</a:t>
-                          </a:r>
-                        </a:p>
-                        <a:p>
-                          <a:pPr marL="342900" lvl="0" indent="-342900" algn="l">
-                            <a:lnSpc>
-                              <a:spcPct val="115000"/>
-                            </a:lnSpc>
-                            <a:spcAft>
-                              <a:spcPts val="0"/>
-                            </a:spcAft>
-                            <a:buFont typeface="Wingdings" panose="05000000000000000000" pitchFamily="2" charset="2"/>
-                            <a:buChar char=""/>
-                          </a:pPr>
-                          <a:r>
-                            <a:rPr lang="en-GB" sz="1200" b="0" kern="1200" dirty="0">
-                              <a:solidFill>
-                                <a:schemeClr val="dk1"/>
-                              </a:solidFill>
-                              <a:effectLst/>
-                              <a:latin typeface="+mn-lt"/>
-                              <a:ea typeface="+mn-ea"/>
-                              <a:cs typeface="+mn-cs"/>
-                            </a:rPr>
-                            <a:t>Binary classification (Buy, Sell)</a:t>
-                          </a:r>
-                        </a:p>
-                        <a:p>
-                          <a:pPr marL="342900" lvl="0" indent="-342900" algn="l">
-                            <a:lnSpc>
-                              <a:spcPct val="115000"/>
-                            </a:lnSpc>
-                            <a:spcAft>
-                              <a:spcPts val="0"/>
-                            </a:spcAft>
-                            <a:buFont typeface="Wingdings" panose="05000000000000000000" pitchFamily="2" charset="2"/>
-                            <a:buChar char=""/>
-                          </a:pPr>
-                          <a:r>
-                            <a:rPr lang="en-GB" sz="1200" b="0" kern="1200" dirty="0">
-                              <a:solidFill>
-                                <a:schemeClr val="dk1"/>
-                              </a:solidFill>
-                              <a:effectLst/>
-                              <a:latin typeface="+mn-lt"/>
-                              <a:ea typeface="+mn-ea"/>
-                              <a:cs typeface="+mn-cs"/>
-                            </a:rPr>
-                            <a:t>3% transaction cost per trade.</a:t>
-                          </a:r>
-                        </a:p>
-                      </a:txBody>
-                      <a:tcPr marL="49480" marR="49480" marT="0" marB="0"/>
-                    </a:tc>
-                    <a:tc>
-                      <a:txBody>
-                        <a:bodyPr/>
-                        <a:lstStyle/>
-                        <a:p>
-                          <a:pPr marL="0" lvl="0" indent="0" algn="ctr">
-                            <a:lnSpc>
-                              <a:spcPct val="115000"/>
-                            </a:lnSpc>
-                            <a:spcAft>
-                              <a:spcPts val="0"/>
-                            </a:spcAft>
-                            <a:buFont typeface="Wingdings" panose="05000000000000000000" pitchFamily="2" charset="2"/>
-                            <a:buNone/>
-                          </a:pPr>
-                          <a:r>
-                            <a:rPr lang="en-GB" sz="1200" b="1" kern="1200" dirty="0">
-                              <a:solidFill>
-                                <a:srgbClr val="FF0000"/>
-                              </a:solidFill>
-                              <a:effectLst/>
-                              <a:latin typeface="+mn-lt"/>
-                              <a:ea typeface="+mn-ea"/>
-                              <a:cs typeface="+mn-cs"/>
-                            </a:rPr>
-                            <a:t>GADF artificial images</a:t>
-                          </a:r>
-                        </a:p>
-                        <a:p>
-                          <a:pPr marL="342900" lvl="0" indent="-342900" algn="l">
-                            <a:lnSpc>
-                              <a:spcPct val="115000"/>
-                            </a:lnSpc>
-                            <a:spcAft>
-                              <a:spcPts val="0"/>
-                            </a:spcAft>
-                            <a:buFont typeface="Wingdings" panose="05000000000000000000" pitchFamily="2" charset="2"/>
-                            <a:buChar char=""/>
-                          </a:pPr>
-                          <a:r>
-                            <a:rPr lang="en-GB" sz="1200" b="0" kern="1200" dirty="0" err="1">
-                              <a:solidFill>
-                                <a:schemeClr val="dk1"/>
-                              </a:solidFill>
-                              <a:effectLst/>
-                              <a:latin typeface="+mn-lt"/>
-                              <a:ea typeface="+mn-ea"/>
-                              <a:cs typeface="+mn-cs"/>
-                            </a:rPr>
-                            <a:t>GAd</a:t>
-                          </a:r>
-                          <a:endParaRPr lang="en-GB" sz="1200" b="0" kern="1200" dirty="0">
+                            <a:rPr lang="en-GB" sz="1050" b="0" kern="1200" dirty="0">
+                              <a:solidFill>
+                                <a:schemeClr val="dk1"/>
+                              </a:solidFill>
+                              <a:effectLst/>
+                              <a:latin typeface="+mn-lt"/>
+                              <a:ea typeface="+mn-ea"/>
+                              <a:cs typeface="+mn-cs"/>
+                            </a:rPr>
+                            <a:t>Daily data. Daily trading. From </a:t>
+                          </a:r>
+                          <a:r>
+                            <a:rPr lang="en-GB" sz="1050" b="0" dirty="0">
+                              <a:effectLst/>
+                            </a:rPr>
+                            <a:t>1980-01 to 2010-01-01.</a:t>
+                          </a:r>
+                          <a:endParaRPr lang="en-GB" sz="1050" b="0" kern="1200" dirty="0">
                             <a:solidFill>
                               <a:schemeClr val="dk1"/>
                             </a:solidFill>
@@ -5270,7 +5407,170 @@
                             <a:buFont typeface="Wingdings" panose="05000000000000000000" pitchFamily="2" charset="2"/>
                             <a:buChar char=""/>
                           </a:pPr>
-                          <a:endParaRPr lang="en-GB" sz="1200" b="0" kern="1200" dirty="0">
+                          <a:r>
+                            <a:rPr lang="en-GB" sz="1050" b="0" kern="1200" dirty="0">
+                              <a:solidFill>
+                                <a:schemeClr val="dk1"/>
+                              </a:solidFill>
+                              <a:effectLst/>
+                              <a:latin typeface="+mn-lt"/>
+                              <a:ea typeface="+mn-ea"/>
+                              <a:cs typeface="+mn-cs"/>
+                            </a:rPr>
+                            <a:t>Starting balance $10,000, position $5,000</a:t>
+                          </a:r>
+                        </a:p>
+                        <a:p>
+                          <a:pPr marL="342900" lvl="0" indent="-342900" algn="l">
+                            <a:lnSpc>
+                              <a:spcPct val="115000"/>
+                            </a:lnSpc>
+                            <a:spcAft>
+                              <a:spcPts val="0"/>
+                            </a:spcAft>
+                            <a:buFont typeface="Wingdings" panose="05000000000000000000" pitchFamily="2" charset="2"/>
+                            <a:buChar char=""/>
+                          </a:pPr>
+                          <a:r>
+                            <a:rPr lang="en-GB" sz="1050" b="0" kern="1200" dirty="0">
+                              <a:solidFill>
+                                <a:schemeClr val="dk1"/>
+                              </a:solidFill>
+                              <a:effectLst/>
+                              <a:latin typeface="+mn-lt"/>
+                              <a:ea typeface="+mn-ea"/>
+                              <a:cs typeface="+mn-cs"/>
+                            </a:rPr>
+                            <a:t>1 step-ahead forecasting</a:t>
+                          </a:r>
+                        </a:p>
+                        <a:p>
+                          <a:pPr marL="342900" lvl="0" indent="-342900" algn="l">
+                            <a:lnSpc>
+                              <a:spcPct val="115000"/>
+                            </a:lnSpc>
+                            <a:spcAft>
+                              <a:spcPts val="0"/>
+                            </a:spcAft>
+                            <a:buFont typeface="Wingdings" panose="05000000000000000000" pitchFamily="2" charset="2"/>
+                            <a:buChar char=""/>
+                          </a:pPr>
+                          <a:r>
+                            <a:rPr lang="en-GB" sz="1050" b="0" kern="1200" dirty="0">
+                              <a:solidFill>
+                                <a:schemeClr val="dk1"/>
+                              </a:solidFill>
+                              <a:effectLst/>
+                              <a:latin typeface="+mn-lt"/>
+                              <a:ea typeface="+mn-ea"/>
+                              <a:cs typeface="+mn-cs"/>
+                            </a:rPr>
+                            <a:t>Using a 10day rolling window</a:t>
+                          </a:r>
+                        </a:p>
+                        <a:p>
+                          <a:pPr marL="342900" lvl="0" indent="-342900" algn="l">
+                            <a:lnSpc>
+                              <a:spcPct val="115000"/>
+                            </a:lnSpc>
+                            <a:spcAft>
+                              <a:spcPts val="0"/>
+                            </a:spcAft>
+                            <a:buFont typeface="Wingdings" panose="05000000000000000000" pitchFamily="2" charset="2"/>
+                            <a:buChar char=""/>
+                          </a:pPr>
+                          <a:r>
+                            <a:rPr lang="en-GB" sz="1050" b="0" kern="1200" dirty="0">
+                              <a:solidFill>
+                                <a:schemeClr val="dk1"/>
+                              </a:solidFill>
+                              <a:effectLst/>
+                              <a:latin typeface="+mn-lt"/>
+                              <a:ea typeface="+mn-ea"/>
+                              <a:cs typeface="+mn-cs"/>
+                            </a:rPr>
+                            <a:t>Binary classification (Buy, Sell)</a:t>
+                          </a:r>
+                        </a:p>
+                        <a:p>
+                          <a:pPr marL="342900" lvl="0" indent="-342900" algn="l">
+                            <a:lnSpc>
+                              <a:spcPct val="115000"/>
+                            </a:lnSpc>
+                            <a:spcAft>
+                              <a:spcPts val="0"/>
+                            </a:spcAft>
+                            <a:buFont typeface="Wingdings" panose="05000000000000000000" pitchFamily="2" charset="2"/>
+                            <a:buChar char=""/>
+                          </a:pPr>
+                          <a:r>
+                            <a:rPr lang="en-GB" sz="1050" b="0" kern="1200" dirty="0">
+                              <a:solidFill>
+                                <a:schemeClr val="dk1"/>
+                              </a:solidFill>
+                              <a:effectLst/>
+                              <a:latin typeface="+mn-lt"/>
+                              <a:ea typeface="+mn-ea"/>
+                              <a:cs typeface="+mn-cs"/>
+                            </a:rPr>
+                            <a:t>3% transaction cost per trade.</a:t>
+                          </a:r>
+                        </a:p>
+                      </a:txBody>
+                      <a:tcPr marL="49480" marR="49480" marT="0" marB="0"/>
+                    </a:tc>
+                    <a:tc>
+                      <a:txBody>
+                        <a:bodyPr/>
+                        <a:lstStyle/>
+                        <a:p>
+                          <a:pPr marL="0" lvl="0" indent="0" algn="ctr">
+                            <a:lnSpc>
+                              <a:spcPct val="115000"/>
+                            </a:lnSpc>
+                            <a:spcAft>
+                              <a:spcPts val="0"/>
+                            </a:spcAft>
+                            <a:buFont typeface="Wingdings" panose="05000000000000000000" pitchFamily="2" charset="2"/>
+                            <a:buNone/>
+                          </a:pPr>
+                          <a:r>
+                            <a:rPr lang="en-GB" sz="1050" b="1" kern="1200" dirty="0">
+                              <a:solidFill>
+                                <a:srgbClr val="FF0000"/>
+                              </a:solidFill>
+                              <a:effectLst/>
+                              <a:latin typeface="+mn-lt"/>
+                              <a:ea typeface="+mn-ea"/>
+                              <a:cs typeface="+mn-cs"/>
+                            </a:rPr>
+                            <a:t>GADF artificial images</a:t>
+                          </a:r>
+                        </a:p>
+                        <a:p>
+                          <a:pPr marL="342900" lvl="0" indent="-342900" algn="l">
+                            <a:lnSpc>
+                              <a:spcPct val="115000"/>
+                            </a:lnSpc>
+                            <a:spcAft>
+                              <a:spcPts val="0"/>
+                            </a:spcAft>
+                            <a:buFont typeface="Wingdings" panose="05000000000000000000" pitchFamily="2" charset="2"/>
+                            <a:buChar char=""/>
+                          </a:pPr>
+                          <a:r>
+                            <a:rPr lang="en-GB" sz="1050" b="0" kern="1200" dirty="0" err="1">
+                              <a:solidFill>
+                                <a:schemeClr val="dk1"/>
+                              </a:solidFill>
+                              <a:effectLst/>
+                              <a:latin typeface="+mn-lt"/>
+                              <a:ea typeface="+mn-ea"/>
+                              <a:cs typeface="+mn-cs"/>
+                            </a:rPr>
+                            <a:t>GAd</a:t>
+                          </a:r>
+                          <a:endParaRPr lang="en-GB" sz="1050" b="0" kern="1200" dirty="0">
                             <a:solidFill>
                               <a:schemeClr val="dk1"/>
                             </a:solidFill>
@@ -5291,7 +5591,7 @@
                             <a:buFont typeface="Wingdings" panose="05000000000000000000" pitchFamily="2" charset="2"/>
                             <a:buChar char=""/>
                           </a:pPr>
-                          <a:endParaRPr lang="en-GB" sz="1200" b="0" kern="1200" dirty="0">
+                          <a:endParaRPr lang="en-GB" sz="1050" b="0" kern="1200" dirty="0">
                             <a:solidFill>
                               <a:schemeClr val="dk1"/>
                             </a:solidFill>
@@ -5312,7 +5612,7 @@
                             <a:buFont typeface="Wingdings" panose="05000000000000000000" pitchFamily="2" charset="2"/>
                             <a:buChar char=""/>
                           </a:pPr>
-                          <a:endParaRPr lang="en-GB" sz="1200" b="0" kern="1200" dirty="0">
+                          <a:endParaRPr lang="en-GB" sz="1050" b="0" kern="1200" dirty="0">
                             <a:solidFill>
                               <a:schemeClr val="dk1"/>
                             </a:solidFill>
@@ -5333,7 +5633,7 @@
                             <a:buFont typeface="Wingdings" panose="05000000000000000000" pitchFamily="2" charset="2"/>
                             <a:buChar char=""/>
                           </a:pPr>
-                          <a:endParaRPr lang="en-GB" sz="1200" b="0" kern="1200" dirty="0">
+                          <a:endParaRPr lang="en-GB" sz="1050" b="0" kern="1200" dirty="0">
                             <a:solidFill>
                               <a:schemeClr val="dk1"/>
                             </a:solidFill>
@@ -5343,62 +5643,18 @@
                             <a:cs typeface="+mn-cs"/>
                           </a:endParaRPr>
                         </a:p>
-                      </a:txBody>
-                      <a:tcPr marL="49480" marR="49480" marT="0" marB="0"/>
-                    </a:tc>
-                    <a:tc>
-                      <a:txBody>
-                        <a:bodyPr/>
-                        <a:lstStyle/>
-                        <a:p>
-                          <a:pPr marL="0" lvl="0" indent="0" algn="ctr">
-                            <a:lnSpc>
-                              <a:spcPct val="115000"/>
-                            </a:lnSpc>
-                            <a:spcAft>
-                              <a:spcPts val="0"/>
-                            </a:spcAft>
-                            <a:buFont typeface="Wingdings" panose="05000000000000000000" pitchFamily="2" charset="2"/>
-                            <a:buNone/>
-                          </a:pPr>
-                          <a:r>
-                            <a:rPr lang="en-GB" sz="1200" b="1" kern="1200" dirty="0">
-                              <a:solidFill>
-                                <a:schemeClr val="dk1"/>
-                              </a:solidFill>
-                              <a:effectLst/>
-                              <a:latin typeface="+mn-lt"/>
-                              <a:ea typeface="+mn-ea"/>
-                              <a:cs typeface="+mn-cs"/>
-                            </a:rPr>
-                            <a:t>REC</a:t>
-                          </a:r>
-                        </a:p>
-                        <a:p>
-                          <a:pPr marL="171450" lvl="0" indent="-171450" algn="l">
-                            <a:lnSpc>
-                              <a:spcPct val="115000"/>
-                            </a:lnSpc>
-                            <a:spcAft>
-                              <a:spcPts val="0"/>
-                            </a:spcAft>
-                            <a:buFont typeface="Wingdings" panose="05000000000000000000" pitchFamily="2" charset="2"/>
-                            <a:buChar char="§"/>
-                          </a:pPr>
-                          <a:r>
-                            <a:rPr lang="en-GB" sz="1200" b="0" kern="1200" dirty="0">
-                              <a:solidFill>
-                                <a:schemeClr val="dk1"/>
-                              </a:solidFill>
-                              <a:effectLst/>
-                              <a:latin typeface="+mn-lt"/>
-                              <a:ea typeface="+mn-ea"/>
-                              <a:cs typeface="+mn-cs"/>
-                              <a:hlinkClick r:id="rId4"/>
-                            </a:rPr>
-                            <a:t>Recursive Feature Elimination</a:t>
-                          </a:r>
-                          <a:endParaRPr lang="en-GB" sz="1200" b="0" kern="1200" dirty="0">
+                        <a:p>
+                          <a:pPr marL="342900" lvl="0" indent="-342900" algn="l">
+                            <a:lnSpc>
+                              <a:spcPct val="115000"/>
+                            </a:lnSpc>
+                            <a:spcAft>
+                              <a:spcPts val="0"/>
+                            </a:spcAft>
+                            <a:buFont typeface="Wingdings" panose="05000000000000000000" pitchFamily="2" charset="2"/>
+                            <a:buChar char=""/>
+                          </a:pPr>
+                          <a:endParaRPr lang="en-GB" sz="1050" b="0" kern="1200" dirty="0">
                             <a:solidFill>
                               <a:schemeClr val="dk1"/>
                             </a:solidFill>
@@ -5408,6 +5664,37 @@
                             <a:cs typeface="+mn-cs"/>
                           </a:endParaRPr>
                         </a:p>
+                      </a:txBody>
+                      <a:tcPr marL="49480" marR="49480" marT="0" marB="0"/>
+                    </a:tc>
+                    <a:tc>
+                      <a:txBody>
+                        <a:bodyPr/>
+                        <a:lstStyle/>
+                        <a:p>
+                          <a:pPr marL="0" lvl="0" indent="0" algn="ctr">
+                            <a:lnSpc>
+                              <a:spcPct val="115000"/>
+                            </a:lnSpc>
+                            <a:spcAft>
+                              <a:spcPts val="0"/>
+                            </a:spcAft>
+                            <a:buFont typeface="Wingdings" panose="05000000000000000000" pitchFamily="2" charset="2"/>
+                            <a:buNone/>
+                          </a:pPr>
+                          <a:r>
+                            <a:rPr lang="en-GB" sz="1050" b="1" kern="1200" dirty="0">
+                              <a:solidFill>
+                                <a:schemeClr val="dk1"/>
+                              </a:solidFill>
+                              <a:effectLst/>
+                              <a:latin typeface="+mn-lt"/>
+                              <a:ea typeface="+mn-ea"/>
+                              <a:cs typeface="+mn-cs"/>
+                            </a:rPr>
+                            <a:t>REC</a:t>
+                          </a:r>
+                        </a:p>
                         <a:p>
                           <a:pPr marL="171450" lvl="0" indent="-171450" algn="l">
                             <a:lnSpc>
@@ -5420,30 +5707,19 @@
                             <a:buChar char="§"/>
                           </a:pPr>
                           <a:r>
-                            <a:rPr lang="en-GB" sz="1200" b="0" kern="1200" dirty="0">
-                              <a:solidFill>
-                                <a:schemeClr val="dk1"/>
-                              </a:solidFill>
-                              <a:effectLst/>
-                              <a:latin typeface="+mn-lt"/>
-                              <a:ea typeface="+mn-ea"/>
-                              <a:cs typeface="+mn-cs"/>
-                            </a:rPr>
-                            <a:t>Shows the relevance of pixels  for the classifier. Can be used to evaluate feature importance.</a:t>
-                          </a:r>
-                        </a:p>
-                        <a:p>
-                          <a:pPr marL="342900" lvl="0" indent="-342900" algn="l">
-                            <a:lnSpc>
-                              <a:spcPct val="115000"/>
-                            </a:lnSpc>
-                            <a:spcAft>
-                              <a:spcPts val="0"/>
-                            </a:spcAft>
-                            <a:buFont typeface="Wingdings" panose="05000000000000000000" pitchFamily="2" charset="2"/>
-                            <a:buChar char=""/>
-                          </a:pPr>
-                          <a:endParaRPr lang="en-GB" sz="1200" b="0" kern="1200" dirty="0">
+                            <a:rPr lang="en-GB" sz="1050" b="0" kern="1200" dirty="0">
+                              <a:solidFill>
+                                <a:schemeClr val="dk1"/>
+                              </a:solidFill>
+                              <a:effectLst/>
+                              <a:latin typeface="+mn-lt"/>
+                              <a:ea typeface="+mn-ea"/>
+                              <a:cs typeface="+mn-cs"/>
+                              <a:hlinkClick r:id="rId4"/>
+                            </a:rPr>
+                            <a:t>Recursive Feature Elimination</a:t>
+                          </a:r>
+                          <a:endParaRPr lang="en-GB" sz="1050" b="0" kern="1200" dirty="0">
                             <a:solidFill>
                               <a:schemeClr val="dk1"/>
                             </a:solidFill>
@@ -5454,6 +5730,30 @@
                           </a:endParaRPr>
                         </a:p>
                         <a:p>
+                          <a:pPr marL="171450" lvl="0" indent="-171450" algn="l">
+                            <a:lnSpc>
+                              <a:spcPct val="115000"/>
+                            </a:lnSpc>
+                            <a:spcAft>
+                              <a:spcPts val="0"/>
+                            </a:spcAft>
+                            <a:buFont typeface="Wingdings" panose="05000000000000000000" pitchFamily="2" charset="2"/>
+                            <a:buChar char="§"/>
+                          </a:pPr>
+                          <a:r>
+                            <a:rPr lang="en-GB" sz="1050" b="0" kern="1200" dirty="0">
+                              <a:solidFill>
+                                <a:schemeClr val="dk1"/>
+                              </a:solidFill>
+                              <a:effectLst/>
+                              <a:latin typeface="+mn-lt"/>
+                              <a:ea typeface="+mn-ea"/>
+                              <a:cs typeface="+mn-cs"/>
+                            </a:rPr>
+                            <a:t>Shows the relevance of pixels  for the classifier. Can be used to evaluate feature importance.</a:t>
+                          </a:r>
+                        </a:p>
+                        <a:p>
                           <a:pPr marL="342900" lvl="0" indent="-342900" algn="l">
                             <a:lnSpc>
                               <a:spcPct val="115000"/>
@@ -5464,7 +5764,7 @@
                             <a:buFont typeface="Wingdings" panose="05000000000000000000" pitchFamily="2" charset="2"/>
                             <a:buChar char=""/>
                           </a:pPr>
-                          <a:endParaRPr lang="en-GB" sz="1200" b="0" kern="1200" dirty="0">
+                          <a:endParaRPr lang="en-GB" sz="1050" b="0" kern="1200" dirty="0">
                             <a:solidFill>
                               <a:schemeClr val="dk1"/>
                             </a:solidFill>
@@ -5474,44 +5774,18 @@
                             <a:cs typeface="+mn-cs"/>
                           </a:endParaRPr>
                         </a:p>
-                      </a:txBody>
-                      <a:tcPr marL="49480" marR="49480" marT="0" marB="0"/>
-                    </a:tc>
-                    <a:tc>
-                      <a:txBody>
-                        <a:bodyPr/>
-                        <a:lstStyle/>
-                        <a:p>
-                          <a:pPr marL="0" marR="0" lvl="0" indent="0" algn="ctr" defTabSz="914400" rtl="0" eaLnBrk="1" fontAlgn="auto" latinLnBrk="0" hangingPunct="1">
-                            <a:lnSpc>
-                              <a:spcPct val="115000"/>
-                            </a:lnSpc>
-                            <a:spcBef>
-                              <a:spcPts val="0"/>
-                            </a:spcBef>
-                            <a:spcAft>
-                              <a:spcPts val="0"/>
-                            </a:spcAft>
-                            <a:buClrTx/>
-                            <a:buSzTx/>
-                            <a:buFont typeface="Wingdings" panose="05000000000000000000" pitchFamily="2" charset="2"/>
-                            <a:buNone/>
-                            <a:tabLst/>
-                            <a:defRPr/>
-                          </a:pPr>
-                          <a:r>
-                            <a:rPr lang="en-GB" sz="1200" b="1" kern="1200" dirty="0">
-                              <a:solidFill>
-                                <a:schemeClr val="dk1"/>
-                              </a:solidFill>
-                              <a:effectLst/>
-                              <a:latin typeface="+mn-lt"/>
-                              <a:ea typeface="+mn-ea"/>
-                              <a:cs typeface="+mn-cs"/>
-                            </a:rPr>
-                            <a:t>PCA</a:t>
-                          </a:r>
-                          <a:endParaRPr lang="en-GB" sz="1200" b="0" kern="1200" dirty="0">
+                        <a:p>
+                          <a:pPr marL="342900" lvl="0" indent="-342900" algn="l">
+                            <a:lnSpc>
+                              <a:spcPct val="115000"/>
+                            </a:lnSpc>
+                            <a:spcAft>
+                              <a:spcPts val="0"/>
+                            </a:spcAft>
+                            <a:buFont typeface="Wingdings" panose="05000000000000000000" pitchFamily="2" charset="2"/>
+                            <a:buChar char=""/>
+                          </a:pPr>
+                          <a:endParaRPr lang="en-GB" sz="1050" b="0" kern="1200" dirty="0">
                             <a:solidFill>
                               <a:schemeClr val="dk1"/>
                             </a:solidFill>
@@ -5521,6 +5795,53 @@
                             <a:cs typeface="+mn-cs"/>
                           </a:endParaRPr>
                         </a:p>
+                      </a:txBody>
+                      <a:tcPr marL="49480" marR="49480" marT="0" marB="0"/>
+                    </a:tc>
+                    <a:tc>
+                      <a:txBody>
+                        <a:bodyPr/>
+                        <a:lstStyle/>
+                        <a:p>
+                          <a:pPr marL="0" marR="0" lvl="0" indent="0" algn="ctr" defTabSz="914400" rtl="0" eaLnBrk="1" fontAlgn="auto" latinLnBrk="0" hangingPunct="1">
+                            <a:lnSpc>
+                              <a:spcPct val="115000"/>
+                            </a:lnSpc>
+                            <a:spcBef>
+                              <a:spcPts val="0"/>
+                            </a:spcBef>
+                            <a:spcAft>
+                              <a:spcPts val="0"/>
+                            </a:spcAft>
+                            <a:buClrTx/>
+                            <a:buSzTx/>
+                            <a:buFont typeface="Wingdings" panose="05000000000000000000" pitchFamily="2" charset="2"/>
+                            <a:buNone/>
+                            <a:tabLst/>
+                            <a:defRPr/>
+                          </a:pPr>
+                          <a:r>
+                            <a:rPr lang="en-GB" sz="1050" b="1" kern="1200" dirty="0">
+                              <a:solidFill>
+                                <a:schemeClr val="dk1"/>
+                              </a:solidFill>
+                              <a:effectLst/>
+                              <a:latin typeface="+mn-lt"/>
+                              <a:ea typeface="+mn-ea"/>
+                              <a:cs typeface="+mn-cs"/>
+                            </a:rPr>
+                            <a:t>PCA</a:t>
+                          </a:r>
+                          <a:endParaRPr lang="en-GB" sz="1050" b="0" kern="1200" dirty="0">
+                            <a:solidFill>
+                              <a:schemeClr val="dk1"/>
+                            </a:solidFill>
+                            <a:effectLst/>
+                            <a:latin typeface="+mn-lt"/>
+                            <a:ea typeface="+mn-ea"/>
+                            <a:cs typeface="+mn-cs"/>
+                          </a:endParaRPr>
+                        </a:p>
                         <a:p>
                           <a:pPr marL="342900" lvl="0" indent="-342900" algn="l">
                             <a:lnSpc>
@@ -5533,7 +5854,7 @@
                             <a:buChar char=""/>
                           </a:pPr>
                           <a:r>
-                            <a:rPr lang="en-GB" sz="1200" b="0" kern="1200" dirty="0">
+                            <a:rPr lang="en-GB" sz="1050" b="0" kern="1200" dirty="0">
                               <a:solidFill>
                                 <a:schemeClr val="dk1"/>
                               </a:solidFill>
@@ -5557,7 +5878,7 @@
                             <a:buChar char=""/>
                           </a:pPr>
                           <a:r>
-                            <a:rPr lang="en-GB" sz="1200" b="0" kern="1200" dirty="0">
+                            <a:rPr lang="en-GB" sz="1050" b="0" kern="1200" dirty="0">
                               <a:solidFill>
                                 <a:schemeClr val="dk1"/>
                               </a:solidFill>
@@ -5581,7 +5902,7 @@
                             <a:buChar char=""/>
                           </a:pPr>
                           <a:r>
-                            <a:rPr lang="en-GB" sz="1200" b="0" kern="1200" dirty="0">
+                            <a:rPr lang="en-GB" sz="1050" b="0" kern="1200" dirty="0">
                               <a:solidFill>
                                 <a:schemeClr val="dk1"/>
                               </a:solidFill>
@@ -5593,7 +5914,7 @@
                             <a:t>Normalized data 0-1. Used </a:t>
                           </a:r>
                           <a:r>
-                            <a:rPr lang="en-GB" sz="1200" b="0" kern="1200" dirty="0" err="1">
+                            <a:rPr lang="en-GB" sz="1050" b="0" kern="1200" dirty="0" err="1">
                               <a:solidFill>
                                 <a:schemeClr val="dk1"/>
                               </a:solidFill>
@@ -5605,7 +5926,7 @@
                             <a:t>covar</a:t>
                           </a:r>
                           <a:r>
-                            <a:rPr lang="en-GB" sz="1200" b="0" kern="1200" dirty="0">
+                            <a:rPr lang="en-GB" sz="1050" b="0" kern="1200" dirty="0">
                               <a:solidFill>
                                 <a:schemeClr val="dk1"/>
                               </a:solidFill>
@@ -5629,7 +5950,7 @@
                             <a:buChar char=""/>
                           </a:pPr>
                           <a:r>
-                            <a:rPr lang="en-GB" sz="1200" b="1" kern="1200" dirty="0">
+                            <a:rPr lang="en-GB" sz="1050" b="1" kern="1200" dirty="0">
                               <a:solidFill>
                                 <a:schemeClr val="dk1"/>
                               </a:solidFill>
@@ -5653,7 +5974,7 @@
                             <a:buChar char=""/>
                           </a:pPr>
                           <a:r>
-                            <a:rPr lang="en-GB" sz="1200" b="0" kern="1200" dirty="0">
+                            <a:rPr lang="en-GB" sz="1050" b="0" kern="1200" dirty="0">
                               <a:solidFill>
                                 <a:srgbClr val="FF0000"/>
                               </a:solidFill>
@@ -5674,7 +5995,7 @@
                       </a:ext>
                     </a:extLst>
                   </a:tr>
-                  <a:tr h="1249553">
+                  <a:tr h="1263824">
                     <a:tc>
                       <a:txBody>
                         <a:bodyPr/>
@@ -5687,7 +6008,7 @@
                         <a:blipFill>
                           <a:blip r:embed="rId5"/>
                           <a:stretch>
-                            <a:fillRect l="-149" t="-324878" r="-193741" b="-130732"/>
+                            <a:fillRect l="-319" t="-306731" r="-214514" b="-134135"/>
                           </a:stretch>
                         </a:blipFill>
                       </a:tcPr>
@@ -5708,7 +6029,7 @@
                             <a:buNone/>
                           </a:pPr>
                           <a:r>
-                            <a:rPr lang="en-GB" sz="1200" b="1" dirty="0">
+                            <a:rPr lang="en-GB" sz="1050" b="1" dirty="0">
                               <a:solidFill>
                                 <a:srgbClr val="FF0000"/>
                               </a:solidFill>
@@ -5729,16 +6050,10 @@
                             <a:buChar char=""/>
                           </a:pPr>
                           <a:r>
-                            <a:rPr lang="en-GB" sz="1200">
-                              <a:effectLst/>
-                            </a:rPr>
-                            <a:t>Probabilistic </a:t>
-                          </a:r>
-                          <a:r>
-                            <a:rPr lang="en-GB" sz="1200" dirty="0">
-                              <a:effectLst/>
-                            </a:rPr>
-                            <a:t>dimensionality reduction technique.</a:t>
+                            <a:rPr lang="en-GB" sz="1050" dirty="0">
+                              <a:effectLst/>
+                            </a:rPr>
+                            <a:t>Probabilistic dimensionality reduction technique.</a:t>
                           </a:r>
                         </a:p>
                         <a:p>
@@ -5753,7 +6068,7 @@
                             <a:buChar char=""/>
                           </a:pPr>
                           <a:r>
-                            <a:rPr lang="en-GB" sz="1200" dirty="0">
+                            <a:rPr lang="en-GB" sz="1050" dirty="0">
                               <a:effectLst/>
                             </a:rPr>
                             <a:t>Captures complex polynomial relationships</a:t>
@@ -5771,7 +6086,7 @@
                             <a:buChar char=""/>
                           </a:pPr>
                           <a:r>
-                            <a:rPr lang="en-GB" sz="1200" dirty="0">
+                            <a:rPr lang="en-GB" sz="1050" dirty="0">
                               <a:effectLst/>
                             </a:rPr>
                             <a:t>Resulting in clearer clusters.</a:t>
@@ -5796,7 +6111,7 @@
                             <a:buNone/>
                           </a:pPr>
                           <a:r>
-                            <a:rPr lang="en-GB" sz="1200" b="1" dirty="0">
+                            <a:rPr lang="en-GB" sz="1050" b="1" dirty="0">
                               <a:solidFill>
                                 <a:srgbClr val="FF0000"/>
                               </a:solidFill>
@@ -5817,7 +6132,7 @@
                             <a:buChar char=""/>
                           </a:pPr>
                           <a:r>
-                            <a:rPr lang="en-GB" sz="1200" dirty="0">
+                            <a:rPr lang="en-GB" sz="1050" dirty="0">
                               <a:effectLst/>
                             </a:rPr>
                             <a:t>Applied on PCs</a:t>
@@ -5835,12 +6150,83 @@
                             <a:buChar char=""/>
                           </a:pPr>
                           <a:r>
-                            <a:rPr lang="en-GB" sz="1200" dirty="0">
+                            <a:rPr lang="en-GB" sz="1050" dirty="0">
                               <a:effectLst/>
                             </a:rPr>
                             <a:t>Decided on 10 clusters</a:t>
                           </a:r>
-                          <a:endParaRPr lang="en-GB" dirty="0"/>
+                        </a:p>
+                        <a:p>
+                          <a:pPr marL="0" marR="0" lvl="0" indent="0" algn="l" defTabSz="914400" rtl="0" eaLnBrk="1" fontAlgn="auto" latinLnBrk="0" hangingPunct="1">
+                            <a:lnSpc>
+                              <a:spcPct val="100000"/>
+                            </a:lnSpc>
+                            <a:spcBef>
+                              <a:spcPts val="0"/>
+                            </a:spcBef>
+                            <a:spcAft>
+                              <a:spcPts val="0"/>
+                            </a:spcAft>
+                            <a:buClrTx/>
+                            <a:buSzTx/>
+                            <a:buFontTx/>
+                            <a:buNone/>
+                            <a:tabLst/>
+                            <a:defRPr/>
+                          </a:pPr>
+                          <a:r>
+                            <a:rPr kumimoji="0" lang="en-GB" sz="1050" b="0" i="0" u="none" strike="noStrike" kern="1200" cap="none" spc="0" normalizeH="0" baseline="0" noProof="0" dirty="0">
+                              <a:ln>
+                                <a:noFill/>
+                              </a:ln>
+                              <a:solidFill>
+                                <a:prstClr val="black"/>
+                              </a:solidFill>
+                              <a:effectLst/>
+                              <a:uLnTx/>
+                              <a:uFillTx/>
+                              <a:latin typeface="+mn-lt"/>
+                              <a:ea typeface="+mn-ea"/>
+                              <a:cs typeface="+mn-cs"/>
+                            </a:rPr>
+                            <a:t>- Enough subgroups to differentiate behaviour, not too many.</a:t>
+                          </a:r>
+                        </a:p>
+                        <a:p>
+                          <a:pPr marL="0" marR="0" lvl="0" indent="0" algn="l" defTabSz="914400" rtl="0" eaLnBrk="1" fontAlgn="auto" latinLnBrk="0" hangingPunct="1">
+                            <a:lnSpc>
+                              <a:spcPct val="100000"/>
+                            </a:lnSpc>
+                            <a:spcBef>
+                              <a:spcPts val="0"/>
+                            </a:spcBef>
+                            <a:spcAft>
+                              <a:spcPts val="0"/>
+                            </a:spcAft>
+                            <a:buClrTx/>
+                            <a:buSzTx/>
+                            <a:buFontTx/>
+                            <a:buNone/>
+                            <a:tabLst/>
+                            <a:defRPr/>
+                          </a:pPr>
+                          <a:r>
+                            <a:rPr kumimoji="0" lang="en-GB" sz="1050" b="0" i="0" u="none" strike="noStrike" kern="1200" cap="none" spc="0" normalizeH="0" baseline="0" noProof="0" dirty="0">
+                              <a:ln>
+                                <a:noFill/>
+                              </a:ln>
+                              <a:solidFill>
+                                <a:prstClr val="black"/>
+                              </a:solidFill>
+                              <a:effectLst/>
+                              <a:uLnTx/>
+                              <a:uFillTx/>
+                              <a:latin typeface="+mn-lt"/>
+                              <a:ea typeface="+mn-ea"/>
+                              <a:cs typeface="+mn-cs"/>
+                            </a:rPr>
+                            <a:t>- K-Means on t-SNE features lends to easier visual interpretation.</a:t>
+                          </a:r>
                         </a:p>
                       </a:txBody>
                       <a:tcPr marL="49480" marR="49480" marT="0" marB="0"/>
@@ -5850,7 +6236,7 @@
                         <a:bodyPr/>
                         <a:lstStyle/>
                         <a:p>
-                          <a:endParaRPr lang="en-GB" dirty="0"/>
+                          <a:endParaRPr lang="en-GB" sz="1050" dirty="0"/>
                         </a:p>
                       </a:txBody>
                       <a:tcPr marL="49480" marR="49480" marT="0" marB="0"/>
@@ -5861,7 +6247,7 @@
                       </a:ext>
                     </a:extLst>
                   </a:tr>
-                  <a:tr h="1620393">
+                  <a:tr h="1609725">
                     <a:tc gridSpan="4">
                       <a:txBody>
                         <a:bodyPr/>
@@ -5888,7 +6274,7 @@
                               <a:spcPct val="107000"/>
                             </a:lnSpc>
                             <a:spcAft>
-                              <a:spcPts val="0"/>
+                              <a:spcPts val="300"/>
                             </a:spcAft>
                           </a:pPr>
                           <a:r>
@@ -5901,29 +6287,51 @@
                               <a:ea typeface="+mn-ea"/>
                               <a:cs typeface="+mn-cs"/>
                             </a:rPr>
-                            <a:t>- Alternative H1 proven correct. Historically, certain subgroups of trades were considerably more profitable. Their profitability fluctuated with time. This approach is better than placing a flat threshold on classification accuracy (all unprofitable). Subgroups differ mostly by type of action (Long/Short), the most profitable group (1) was comprised of 222 Long trades.</a:t>
-                          </a:r>
-                        </a:p>
-                        <a:p>
-                          <a:pPr algn="l">
+                            <a:t>- Alternative </a:t>
+                          </a:r>
+                          <a:r>
+                            <a:rPr lang="en-GB" sz="1200" b="1" i="1" kern="1200" dirty="0">
+                              <a:solidFill>
+                                <a:srgbClr val="0070C0"/>
+                              </a:solidFill>
+                              <a:effectLst/>
+                              <a:latin typeface="+mn-lt"/>
+                              <a:ea typeface="+mn-ea"/>
+                              <a:cs typeface="+mn-cs"/>
+                            </a:rPr>
+                            <a:t>H1 proven correct</a:t>
+                          </a:r>
+                          <a:r>
+                            <a:rPr lang="en-GB" sz="1200" b="0" kern="1200" dirty="0">
+                              <a:solidFill>
+                                <a:schemeClr val="dk1"/>
+                              </a:solidFill>
+                              <a:effectLst/>
+                              <a:latin typeface="+mn-lt"/>
+                              <a:ea typeface="+mn-ea"/>
+                              <a:cs typeface="+mn-cs"/>
+                            </a:rPr>
+                            <a:t>. Historically, certain subgroups of trades were considerably more profitable. Their profitability fluctuated with time. This approach is better than placing a flat threshold on classification accuracy (all unprofitable). Subgroups differ mostly by type of action (Long/Short), the most profitable group (1) was comprised of 222 Long trades.</a:t>
+                          </a:r>
+                        </a:p>
+                        <a:p>
+                          <a:pPr marL="0" marR="0" lvl="0" indent="0" algn="l" defTabSz="914400" rtl="0" eaLnBrk="1" fontAlgn="auto" latinLnBrk="0" hangingPunct="1">
                             <a:lnSpc>
                               <a:spcPct val="107000"/>
                             </a:lnSpc>
-                            <a:spcAft>
-                              <a:spcPts val="0"/>
-                            </a:spcAft>
-                          </a:pPr>
-                          <a:endParaRPr lang="en-GB" sz="1200" b="0" kern="1200" dirty="0">
-                            <a:solidFill>
-                              <a:schemeClr val="dk1"/>
-                            </a:solidFill>
-                            <a:effectLst/>
-                            <a:latin typeface="+mn-lt"/>
-                            <a:ea typeface="+mn-ea"/>
-                            <a:cs typeface="+mn-cs"/>
-                          </a:endParaRPr>
-                        </a:p>
-                        <a:p>
+                            <a:spcBef>
+                              <a:spcPts val="0"/>
+                            </a:spcBef>
+                            <a:spcAft>
+                              <a:spcPts val="0"/>
+                            </a:spcAft>
+                            <a:buClrTx/>
+                            <a:buSzTx/>
+                            <a:buFontTx/>
+                            <a:buNone/>
+                            <a:tabLst/>
+                            <a:defRPr/>
+                          </a:pPr>
                           <a:r>
                             <a:rPr lang="en-GB" sz="1200" b="0" kern="1200" dirty="0">
                               <a:solidFill>
@@ -5934,10 +6342,44 @@
                               <a:ea typeface="+mn-ea"/>
                               <a:cs typeface="+mn-cs"/>
                             </a:rPr>
-                            <a:t>- K-means want to enough subgroups to differentiate behaviour, but large enough to trade</a:t>
-                          </a:r>
-                        </a:p>
-                        <a:p>
+                            <a:t>- Alternative </a:t>
+                          </a:r>
+                          <a:r>
+                            <a:rPr lang="en-GB" sz="1200" b="1" i="1" kern="1200" dirty="0">
+                              <a:solidFill>
+                                <a:srgbClr val="0070C0"/>
+                              </a:solidFill>
+                              <a:effectLst/>
+                              <a:latin typeface="+mn-lt"/>
+                              <a:ea typeface="+mn-ea"/>
+                              <a:cs typeface="+mn-cs"/>
+                            </a:rPr>
+                            <a:t>H2 proven correct</a:t>
+                          </a:r>
+                          <a:r>
+                            <a:rPr lang="en-GB" sz="1200" b="0" i="0" kern="1200" dirty="0">
+                              <a:solidFill>
+                                <a:srgbClr val="0070C0"/>
+                              </a:solidFill>
+                              <a:effectLst/>
+                              <a:latin typeface="+mn-lt"/>
+                              <a:ea typeface="+mn-ea"/>
+                              <a:cs typeface="+mn-cs"/>
+                            </a:rPr>
+                            <a:t> </a:t>
+                          </a:r>
+                          <a:r>
+                            <a:rPr lang="en-GB" sz="1200" b="0" i="0" kern="1200" dirty="0">
+                              <a:solidFill>
+                                <a:schemeClr val="dk1"/>
+                              </a:solidFill>
+                              <a:effectLst/>
+                              <a:latin typeface="+mn-lt"/>
+                              <a:ea typeface="+mn-ea"/>
+                              <a:cs typeface="+mn-cs"/>
+                            </a:rPr>
+                            <a:t>with 70 trade sample</a:t>
+                          </a:r>
                           <a:r>
                             <a:rPr lang="en-GB" sz="1200" b="0" kern="1200" dirty="0">
                               <a:solidFill>
@@ -5948,14 +6390,184 @@
                               <a:ea typeface="+mn-ea"/>
                               <a:cs typeface="+mn-cs"/>
                             </a:rPr>
-                            <a:t>- K-Means on t-SNE features lends to easier visual interpretation_</a:t>
-                          </a:r>
-                        </a:p>
-                        <a:p>
-                          <a:endParaRPr lang="en-GB" sz="1200" dirty="0"/>
-                        </a:p>
-                        <a:p>
-                          <a:endParaRPr lang="en-GB" dirty="0"/>
+                            <a:t>. Using model predictions &amp; analyst judgement -&gt; reduced max loss by $30, raised max win by $20, accuracy +3% vs model, profitability +174%.  Trading only when </a:t>
+                          </a:r>
+                          <a:r>
+                            <a:rPr lang="en-GB" sz="1200" b="0" kern="1200" dirty="0" err="1">
+                              <a:solidFill>
+                                <a:schemeClr val="dk1"/>
+                              </a:solidFill>
+                              <a:effectLst/>
+                              <a:latin typeface="+mn-lt"/>
+                              <a:ea typeface="+mn-ea"/>
+                              <a:cs typeface="+mn-cs"/>
+                            </a:rPr>
+                            <a:t>model&amp;analyst</a:t>
+                          </a:r>
+                          <a:r>
+                            <a:rPr lang="en-GB" sz="1200" b="0" kern="1200" dirty="0">
+                              <a:solidFill>
+                                <a:schemeClr val="dk1"/>
+                              </a:solidFill>
+                              <a:effectLst/>
+                              <a:latin typeface="+mn-lt"/>
+                              <a:ea typeface="+mn-ea"/>
+                              <a:cs typeface="+mn-cs"/>
+                            </a:rPr>
+                            <a:t> predictions match </a:t>
+                          </a:r>
+                          <a:r>
+                            <a:rPr lang="en-GB" sz="1200" b="0" kern="1200" dirty="0">
+                              <a:solidFill>
+                                <a:schemeClr val="dk1"/>
+                              </a:solidFill>
+                              <a:effectLst/>
+                              <a:latin typeface="+mn-lt"/>
+                              <a:ea typeface="+mn-ea"/>
+                              <a:cs typeface="+mn-cs"/>
+                              <a:sym typeface="Wingdings" panose="05000000000000000000" pitchFamily="2" charset="2"/>
+                            </a:rPr>
+                            <a:t>-&gt;</a:t>
+                          </a:r>
+                          <a:r>
+                            <a:rPr lang="en-GB" sz="1200" b="0" kern="1200" dirty="0">
+                              <a:solidFill>
+                                <a:schemeClr val="dk1"/>
+                              </a:solidFill>
+                              <a:effectLst/>
+                              <a:latin typeface="+mn-lt"/>
+                              <a:ea typeface="+mn-ea"/>
+                              <a:cs typeface="+mn-cs"/>
+                            </a:rPr>
+                            <a:t> reduced trades to 39, accuracy +11.5% vs model, profitability +174%, -trading pattern like model, reduced max loss by $30, no change max win.</a:t>
+                          </a:r>
+                        </a:p>
+                        <a:p>
+                          <a:pPr marL="0" marR="0" lvl="0" indent="0" algn="l" defTabSz="914400" rtl="0" eaLnBrk="1" fontAlgn="auto" latinLnBrk="0" hangingPunct="1">
+                            <a:lnSpc>
+                              <a:spcPct val="107000"/>
+                            </a:lnSpc>
+                            <a:spcBef>
+                              <a:spcPts val="0"/>
+                            </a:spcBef>
+                            <a:spcAft>
+                              <a:spcPts val="0"/>
+                            </a:spcAft>
+                            <a:buClrTx/>
+                            <a:buSzTx/>
+                            <a:buFontTx/>
+                            <a:buNone/>
+                            <a:tabLst/>
+                            <a:defRPr/>
+                          </a:pPr>
+                          <a:r>
+                            <a:rPr lang="en-GB" sz="1200" b="0" kern="1200" dirty="0">
+                              <a:solidFill>
+                                <a:schemeClr val="dk1"/>
+                              </a:solidFill>
+                              <a:effectLst/>
+                              <a:latin typeface="+mn-lt"/>
+                              <a:ea typeface="+mn-ea"/>
+                              <a:cs typeface="+mn-cs"/>
+                            </a:rPr>
+                            <a:t>- Evaluated hybrid-trading on unseen data 2010-11, forecasted actions &amp; cluster group. Model accuracy fell to 43%. </a:t>
+                          </a:r>
+                          <a:r>
+                            <a:rPr lang="en-GB" sz="1200" b="1" kern="1200" dirty="0">
+                              <a:solidFill>
+                                <a:schemeClr val="dk1"/>
+                              </a:solidFill>
+                              <a:effectLst/>
+                              <a:latin typeface="+mn-lt"/>
+                              <a:ea typeface="+mn-ea"/>
+                              <a:cs typeface="+mn-cs"/>
+                            </a:rPr>
+                            <a:t>Profitability of clusters changed –affected performance</a:t>
+                          </a:r>
+                          <a:r>
+                            <a:rPr lang="en-GB" sz="1200" b="0" kern="1200" dirty="0">
+                              <a:solidFill>
+                                <a:schemeClr val="dk1"/>
+                              </a:solidFill>
+                              <a:effectLst/>
+                              <a:latin typeface="+mn-lt"/>
+                              <a:ea typeface="+mn-ea"/>
+                              <a:cs typeface="+mn-cs"/>
+                            </a:rPr>
+                            <a:t>. However certain clusters remained more profitable (</a:t>
+                          </a:r>
+                          <a:r>
+                            <a:rPr lang="en-GB" sz="1200" b="1" kern="1200" dirty="0">
+                              <a:solidFill>
+                                <a:schemeClr val="dk1"/>
+                              </a:solidFill>
+                              <a:effectLst/>
+                              <a:latin typeface="+mn-lt"/>
+                              <a:ea typeface="+mn-ea"/>
+                              <a:cs typeface="+mn-cs"/>
+                            </a:rPr>
+                            <a:t>H1</a:t>
+                          </a:r>
+                          <a:r>
+                            <a:rPr lang="en-GB" sz="1200" b="0" kern="1200" dirty="0">
+                              <a:solidFill>
+                                <a:schemeClr val="dk1"/>
+                              </a:solidFill>
+                              <a:effectLst/>
+                              <a:latin typeface="+mn-lt"/>
+                              <a:ea typeface="+mn-ea"/>
+                              <a:cs typeface="+mn-cs"/>
+                            </a:rPr>
+                            <a:t> stands). Hybrid trading &gt; model based, particularly </a:t>
+                          </a:r>
+                          <a:r>
+                            <a:rPr lang="en-GB" sz="1200" b="1" kern="1200" dirty="0">
+                              <a:solidFill>
+                                <a:schemeClr val="dk1"/>
+                              </a:solidFill>
+                              <a:effectLst/>
+                              <a:latin typeface="+mn-lt"/>
+                              <a:ea typeface="+mn-ea"/>
+                              <a:cs typeface="+mn-cs"/>
+                            </a:rPr>
+                            <a:t>Hybrid-Match</a:t>
+                          </a:r>
+                          <a:r>
+                            <a:rPr lang="en-GB" sz="1200" b="0" kern="1200" dirty="0">
+                              <a:solidFill>
+                                <a:schemeClr val="dk1"/>
+                              </a:solidFill>
+                              <a:effectLst/>
+                              <a:latin typeface="+mn-lt"/>
+                              <a:ea typeface="+mn-ea"/>
+                              <a:cs typeface="+mn-cs"/>
+                            </a:rPr>
+                            <a:t>(</a:t>
+                          </a:r>
+                          <a:r>
+                            <a:rPr lang="en-GB" sz="1200" b="1" kern="1200" dirty="0">
+                              <a:solidFill>
+                                <a:schemeClr val="dk1"/>
+                              </a:solidFill>
+                              <a:effectLst/>
+                              <a:latin typeface="+mn-lt"/>
+                              <a:ea typeface="+mn-ea"/>
+                              <a:cs typeface="+mn-cs"/>
+                            </a:rPr>
+                            <a:t>H2</a:t>
+                          </a:r>
+                          <a:r>
+                            <a:rPr lang="en-GB" sz="1200" b="0" kern="1200" dirty="0">
+                              <a:solidFill>
+                                <a:schemeClr val="dk1"/>
+                              </a:solidFill>
+                              <a:effectLst/>
+                              <a:latin typeface="+mn-lt"/>
+                              <a:ea typeface="+mn-ea"/>
+                              <a:cs typeface="+mn-cs"/>
+                            </a:rPr>
+                            <a:t>). Both model and analyst capture unique insight. Ensemble approach superior.</a:t>
+                          </a:r>
                         </a:p>
                       </a:txBody>
                       <a:tcPr marL="49480" marR="49480" marT="0" marB="0"/>

</xml_diff>